<commit_message>
Add more about Java
</commit_message>
<xml_diff>
--- a/assets/images/Images.pptx
+++ b/assets/images/Images.pptx
@@ -4,8 +4,12 @@
   <p:sldMasterIdLst>
     <p:sldMasterId id="2147483648" r:id="rId1"/>
   </p:sldMasterIdLst>
+  <p:notesMasterIdLst>
+    <p:notesMasterId r:id="rId4"/>
+  </p:notesMasterIdLst>
   <p:sldIdLst>
-    <p:sldId id="256" r:id="rId2"/>
+    <p:sldId id="257" r:id="rId2"/>
+    <p:sldId id="256" r:id="rId3"/>
   </p:sldIdLst>
   <p:sldSz cx="12192000" cy="6858000"/>
   <p:notesSz cx="6858000" cy="9144000"/>
@@ -104,7 +108,445 @@
       </a:defRPr>
     </a:lvl9pPr>
   </p:defaultTextStyle>
+  <p:extLst>
+    <p:ext uri="{EFAFB233-063F-42B5-8137-9DF3F51BA10A}">
+      <p15:sldGuideLst xmlns:p15="http://schemas.microsoft.com/office/powerpoint/2012/main"/>
+    </p:ext>
+  </p:extLst>
 </p:presentation>
+</file>
+
+<file path=ppt/notesMasters/notesMaster1.xml><?xml version="1.0" encoding="utf-8"?>
+<p:notesMaster xmlns:a="http://schemas.openxmlformats.org/drawingml/2006/main" xmlns:r="http://schemas.openxmlformats.org/officeDocument/2006/relationships" xmlns:p="http://schemas.openxmlformats.org/presentationml/2006/main">
+  <p:cSld>
+    <p:bg>
+      <p:bgRef idx="1001">
+        <a:schemeClr val="bg1"/>
+      </p:bgRef>
+    </p:bg>
+    <p:spTree>
+      <p:nvGrpSpPr>
+        <p:cNvPr id="1" name=""/>
+        <p:cNvGrpSpPr/>
+        <p:nvPr/>
+      </p:nvGrpSpPr>
+      <p:grpSpPr>
+        <a:xfrm>
+          <a:off x="0" y="0"/>
+          <a:ext cx="0" cy="0"/>
+          <a:chOff x="0" y="0"/>
+          <a:chExt cx="0" cy="0"/>
+        </a:xfrm>
+      </p:grpSpPr>
+      <p:sp>
+        <p:nvSpPr>
+          <p:cNvPr id="2" name="Header Placeholder 1"/>
+          <p:cNvSpPr>
+            <a:spLocks noGrp="1"/>
+          </p:cNvSpPr>
+          <p:nvPr>
+            <p:ph type="hdr" sz="quarter"/>
+          </p:nvPr>
+        </p:nvSpPr>
+        <p:spPr>
+          <a:xfrm>
+            <a:off x="0" y="0"/>
+            <a:ext cx="2971800" cy="458788"/>
+          </a:xfrm>
+          <a:prstGeom prst="rect">
+            <a:avLst/>
+          </a:prstGeom>
+        </p:spPr>
+        <p:txBody>
+          <a:bodyPr vert="horz" lIns="91440" tIns="45720" rIns="91440" bIns="45720" rtlCol="0"/>
+          <a:lstStyle>
+            <a:lvl1pPr algn="l">
+              <a:defRPr sz="1200"/>
+            </a:lvl1pPr>
+          </a:lstStyle>
+          <a:p>
+            <a:endParaRPr lang="en-GB"/>
+          </a:p>
+        </p:txBody>
+      </p:sp>
+      <p:sp>
+        <p:nvSpPr>
+          <p:cNvPr id="3" name="Date Placeholder 2"/>
+          <p:cNvSpPr>
+            <a:spLocks noGrp="1"/>
+          </p:cNvSpPr>
+          <p:nvPr>
+            <p:ph type="dt" idx="1"/>
+          </p:nvPr>
+        </p:nvSpPr>
+        <p:spPr>
+          <a:xfrm>
+            <a:off x="3884613" y="0"/>
+            <a:ext cx="2971800" cy="458788"/>
+          </a:xfrm>
+          <a:prstGeom prst="rect">
+            <a:avLst/>
+          </a:prstGeom>
+        </p:spPr>
+        <p:txBody>
+          <a:bodyPr vert="horz" lIns="91440" tIns="45720" rIns="91440" bIns="45720" rtlCol="0"/>
+          <a:lstStyle>
+            <a:lvl1pPr algn="r">
+              <a:defRPr sz="1200"/>
+            </a:lvl1pPr>
+          </a:lstStyle>
+          <a:p>
+            <a:fld id="{F0373C07-0034-D84F-B0CB-1249B408AEAD}" type="datetimeFigureOut">
+              <a:rPr lang="en-GB" smtClean="0"/>
+              <a:t>05/05/2020</a:t>
+            </a:fld>
+            <a:endParaRPr lang="en-GB"/>
+          </a:p>
+        </p:txBody>
+      </p:sp>
+      <p:sp>
+        <p:nvSpPr>
+          <p:cNvPr id="4" name="Slide Image Placeholder 3"/>
+          <p:cNvSpPr>
+            <a:spLocks noGrp="1" noRot="1" noChangeAspect="1"/>
+          </p:cNvSpPr>
+          <p:nvPr>
+            <p:ph type="sldImg" idx="2"/>
+          </p:nvPr>
+        </p:nvSpPr>
+        <p:spPr>
+          <a:xfrm>
+            <a:off x="685800" y="1143000"/>
+            <a:ext cx="5486400" cy="3086100"/>
+          </a:xfrm>
+          <a:prstGeom prst="rect">
+            <a:avLst/>
+          </a:prstGeom>
+          <a:noFill/>
+          <a:ln w="12700">
+            <a:solidFill>
+              <a:prstClr val="black"/>
+            </a:solidFill>
+          </a:ln>
+        </p:spPr>
+        <p:txBody>
+          <a:bodyPr vert="horz" lIns="91440" tIns="45720" rIns="91440" bIns="45720" rtlCol="0" anchor="ctr"/>
+          <a:lstStyle/>
+          <a:p>
+            <a:endParaRPr lang="en-GB"/>
+          </a:p>
+        </p:txBody>
+      </p:sp>
+      <p:sp>
+        <p:nvSpPr>
+          <p:cNvPr id="5" name="Notes Placeholder 4"/>
+          <p:cNvSpPr>
+            <a:spLocks noGrp="1"/>
+          </p:cNvSpPr>
+          <p:nvPr>
+            <p:ph type="body" sz="quarter" idx="3"/>
+          </p:nvPr>
+        </p:nvSpPr>
+        <p:spPr>
+          <a:xfrm>
+            <a:off x="685800" y="4400550"/>
+            <a:ext cx="5486400" cy="3600450"/>
+          </a:xfrm>
+          <a:prstGeom prst="rect">
+            <a:avLst/>
+          </a:prstGeom>
+        </p:spPr>
+        <p:txBody>
+          <a:bodyPr vert="horz" lIns="91440" tIns="45720" rIns="91440" bIns="45720" rtlCol="0"/>
+          <a:lstStyle/>
+          <a:p>
+            <a:pPr lvl="0"/>
+            <a:r>
+              <a:rPr lang="en-GB"/>
+              <a:t>Click to edit Master text styles</a:t>
+            </a:r>
+          </a:p>
+          <a:p>
+            <a:pPr lvl="1"/>
+            <a:r>
+              <a:rPr lang="en-GB"/>
+              <a:t>Second level</a:t>
+            </a:r>
+          </a:p>
+          <a:p>
+            <a:pPr lvl="2"/>
+            <a:r>
+              <a:rPr lang="en-GB"/>
+              <a:t>Third level</a:t>
+            </a:r>
+          </a:p>
+          <a:p>
+            <a:pPr lvl="3"/>
+            <a:r>
+              <a:rPr lang="en-GB"/>
+              <a:t>Fourth level</a:t>
+            </a:r>
+          </a:p>
+          <a:p>
+            <a:pPr lvl="4"/>
+            <a:r>
+              <a:rPr lang="en-GB"/>
+              <a:t>Fifth level</a:t>
+            </a:r>
+          </a:p>
+        </p:txBody>
+      </p:sp>
+      <p:sp>
+        <p:nvSpPr>
+          <p:cNvPr id="6" name="Footer Placeholder 5"/>
+          <p:cNvSpPr>
+            <a:spLocks noGrp="1"/>
+          </p:cNvSpPr>
+          <p:nvPr>
+            <p:ph type="ftr" sz="quarter" idx="4"/>
+          </p:nvPr>
+        </p:nvSpPr>
+        <p:spPr>
+          <a:xfrm>
+            <a:off x="0" y="8685213"/>
+            <a:ext cx="2971800" cy="458787"/>
+          </a:xfrm>
+          <a:prstGeom prst="rect">
+            <a:avLst/>
+          </a:prstGeom>
+        </p:spPr>
+        <p:txBody>
+          <a:bodyPr vert="horz" lIns="91440" tIns="45720" rIns="91440" bIns="45720" rtlCol="0" anchor="b"/>
+          <a:lstStyle>
+            <a:lvl1pPr algn="l">
+              <a:defRPr sz="1200"/>
+            </a:lvl1pPr>
+          </a:lstStyle>
+          <a:p>
+            <a:endParaRPr lang="en-GB"/>
+          </a:p>
+        </p:txBody>
+      </p:sp>
+      <p:sp>
+        <p:nvSpPr>
+          <p:cNvPr id="7" name="Slide Number Placeholder 6"/>
+          <p:cNvSpPr>
+            <a:spLocks noGrp="1"/>
+          </p:cNvSpPr>
+          <p:nvPr>
+            <p:ph type="sldNum" sz="quarter" idx="5"/>
+          </p:nvPr>
+        </p:nvSpPr>
+        <p:spPr>
+          <a:xfrm>
+            <a:off x="3884613" y="8685213"/>
+            <a:ext cx="2971800" cy="458787"/>
+          </a:xfrm>
+          <a:prstGeom prst="rect">
+            <a:avLst/>
+          </a:prstGeom>
+        </p:spPr>
+        <p:txBody>
+          <a:bodyPr vert="horz" lIns="91440" tIns="45720" rIns="91440" bIns="45720" rtlCol="0" anchor="b"/>
+          <a:lstStyle>
+            <a:lvl1pPr algn="r">
+              <a:defRPr sz="1200"/>
+            </a:lvl1pPr>
+          </a:lstStyle>
+          <a:p>
+            <a:fld id="{11A96E62-EC5F-C045-9FEB-EDD3A98888BE}" type="slidenum">
+              <a:rPr lang="en-GB" smtClean="0"/>
+              <a:t>‹#›</a:t>
+            </a:fld>
+            <a:endParaRPr lang="en-GB"/>
+          </a:p>
+        </p:txBody>
+      </p:sp>
+    </p:spTree>
+    <p:extLst>
+      <p:ext uri="{BB962C8B-B14F-4D97-AF65-F5344CB8AC3E}">
+        <p14:creationId xmlns:p14="http://schemas.microsoft.com/office/powerpoint/2010/main" val="2789218234"/>
+      </p:ext>
+    </p:extLst>
+  </p:cSld>
+  <p:clrMap bg1="lt1" tx1="dk1" bg2="lt2" tx2="dk2" accent1="accent1" accent2="accent2" accent3="accent3" accent4="accent4" accent5="accent5" accent6="accent6" hlink="hlink" folHlink="folHlink"/>
+  <p:notesStyle>
+    <a:lvl1pPr marL="0" algn="l" defTabSz="914400" rtl="0" eaLnBrk="1" latinLnBrk="0" hangingPunct="1">
+      <a:defRPr sz="1200" kern="1200">
+        <a:solidFill>
+          <a:schemeClr val="tx1"/>
+        </a:solidFill>
+        <a:latin typeface="+mn-lt"/>
+        <a:ea typeface="+mn-ea"/>
+        <a:cs typeface="+mn-cs"/>
+      </a:defRPr>
+    </a:lvl1pPr>
+    <a:lvl2pPr marL="457200" algn="l" defTabSz="914400" rtl="0" eaLnBrk="1" latinLnBrk="0" hangingPunct="1">
+      <a:defRPr sz="1200" kern="1200">
+        <a:solidFill>
+          <a:schemeClr val="tx1"/>
+        </a:solidFill>
+        <a:latin typeface="+mn-lt"/>
+        <a:ea typeface="+mn-ea"/>
+        <a:cs typeface="+mn-cs"/>
+      </a:defRPr>
+    </a:lvl2pPr>
+    <a:lvl3pPr marL="914400" algn="l" defTabSz="914400" rtl="0" eaLnBrk="1" latinLnBrk="0" hangingPunct="1">
+      <a:defRPr sz="1200" kern="1200">
+        <a:solidFill>
+          <a:schemeClr val="tx1"/>
+        </a:solidFill>
+        <a:latin typeface="+mn-lt"/>
+        <a:ea typeface="+mn-ea"/>
+        <a:cs typeface="+mn-cs"/>
+      </a:defRPr>
+    </a:lvl3pPr>
+    <a:lvl4pPr marL="1371600" algn="l" defTabSz="914400" rtl="0" eaLnBrk="1" latinLnBrk="0" hangingPunct="1">
+      <a:defRPr sz="1200" kern="1200">
+        <a:solidFill>
+          <a:schemeClr val="tx1"/>
+        </a:solidFill>
+        <a:latin typeface="+mn-lt"/>
+        <a:ea typeface="+mn-ea"/>
+        <a:cs typeface="+mn-cs"/>
+      </a:defRPr>
+    </a:lvl4pPr>
+    <a:lvl5pPr marL="1828800" algn="l" defTabSz="914400" rtl="0" eaLnBrk="1" latinLnBrk="0" hangingPunct="1">
+      <a:defRPr sz="1200" kern="1200">
+        <a:solidFill>
+          <a:schemeClr val="tx1"/>
+        </a:solidFill>
+        <a:latin typeface="+mn-lt"/>
+        <a:ea typeface="+mn-ea"/>
+        <a:cs typeface="+mn-cs"/>
+      </a:defRPr>
+    </a:lvl5pPr>
+    <a:lvl6pPr marL="2286000" algn="l" defTabSz="914400" rtl="0" eaLnBrk="1" latinLnBrk="0" hangingPunct="1">
+      <a:defRPr sz="1200" kern="1200">
+        <a:solidFill>
+          <a:schemeClr val="tx1"/>
+        </a:solidFill>
+        <a:latin typeface="+mn-lt"/>
+        <a:ea typeface="+mn-ea"/>
+        <a:cs typeface="+mn-cs"/>
+      </a:defRPr>
+    </a:lvl6pPr>
+    <a:lvl7pPr marL="2743200" algn="l" defTabSz="914400" rtl="0" eaLnBrk="1" latinLnBrk="0" hangingPunct="1">
+      <a:defRPr sz="1200" kern="1200">
+        <a:solidFill>
+          <a:schemeClr val="tx1"/>
+        </a:solidFill>
+        <a:latin typeface="+mn-lt"/>
+        <a:ea typeface="+mn-ea"/>
+        <a:cs typeface="+mn-cs"/>
+      </a:defRPr>
+    </a:lvl7pPr>
+    <a:lvl8pPr marL="3200400" algn="l" defTabSz="914400" rtl="0" eaLnBrk="1" latinLnBrk="0" hangingPunct="1">
+      <a:defRPr sz="1200" kern="1200">
+        <a:solidFill>
+          <a:schemeClr val="tx1"/>
+        </a:solidFill>
+        <a:latin typeface="+mn-lt"/>
+        <a:ea typeface="+mn-ea"/>
+        <a:cs typeface="+mn-cs"/>
+      </a:defRPr>
+    </a:lvl8pPr>
+    <a:lvl9pPr marL="3657600" algn="l" defTabSz="914400" rtl="0" eaLnBrk="1" latinLnBrk="0" hangingPunct="1">
+      <a:defRPr sz="1200" kern="1200">
+        <a:solidFill>
+          <a:schemeClr val="tx1"/>
+        </a:solidFill>
+        <a:latin typeface="+mn-lt"/>
+        <a:ea typeface="+mn-ea"/>
+        <a:cs typeface="+mn-cs"/>
+      </a:defRPr>
+    </a:lvl9pPr>
+  </p:notesStyle>
+</p:notesMaster>
+</file>
+
+<file path=ppt/notesSlides/notesSlide1.xml><?xml version="1.0" encoding="utf-8"?>
+<p:notes xmlns:a="http://schemas.openxmlformats.org/drawingml/2006/main" xmlns:r="http://schemas.openxmlformats.org/officeDocument/2006/relationships" xmlns:p="http://schemas.openxmlformats.org/presentationml/2006/main">
+  <p:cSld>
+    <p:spTree>
+      <p:nvGrpSpPr>
+        <p:cNvPr id="1" name=""/>
+        <p:cNvGrpSpPr/>
+        <p:nvPr/>
+      </p:nvGrpSpPr>
+      <p:grpSpPr>
+        <a:xfrm>
+          <a:off x="0" y="0"/>
+          <a:ext cx="0" cy="0"/>
+          <a:chOff x="0" y="0"/>
+          <a:chExt cx="0" cy="0"/>
+        </a:xfrm>
+      </p:grpSpPr>
+      <p:sp>
+        <p:nvSpPr>
+          <p:cNvPr id="2" name="Slide Image Placeholder 1"/>
+          <p:cNvSpPr>
+            <a:spLocks noGrp="1" noRot="1" noChangeAspect="1"/>
+          </p:cNvSpPr>
+          <p:nvPr>
+            <p:ph type="sldImg"/>
+          </p:nvPr>
+        </p:nvSpPr>
+        <p:spPr/>
+      </p:sp>
+      <p:sp>
+        <p:nvSpPr>
+          <p:cNvPr id="3" name="Notes Placeholder 2"/>
+          <p:cNvSpPr>
+            <a:spLocks noGrp="1"/>
+          </p:cNvSpPr>
+          <p:nvPr>
+            <p:ph type="body" idx="1"/>
+          </p:nvPr>
+        </p:nvSpPr>
+        <p:spPr/>
+        <p:txBody>
+          <a:bodyPr/>
+          <a:lstStyle/>
+          <a:p>
+            <a:endParaRPr lang="en-GB" dirty="0"/>
+          </a:p>
+        </p:txBody>
+      </p:sp>
+      <p:sp>
+        <p:nvSpPr>
+          <p:cNvPr id="4" name="Slide Number Placeholder 3"/>
+          <p:cNvSpPr>
+            <a:spLocks noGrp="1"/>
+          </p:cNvSpPr>
+          <p:nvPr>
+            <p:ph type="sldNum" sz="quarter" idx="5"/>
+          </p:nvPr>
+        </p:nvSpPr>
+        <p:spPr/>
+        <p:txBody>
+          <a:bodyPr/>
+          <a:lstStyle/>
+          <a:p>
+            <a:fld id="{11A96E62-EC5F-C045-9FEB-EDD3A98888BE}" type="slidenum">
+              <a:rPr lang="en-GB" smtClean="0"/>
+              <a:t>1</a:t>
+            </a:fld>
+            <a:endParaRPr lang="en-GB"/>
+          </a:p>
+        </p:txBody>
+      </p:sp>
+    </p:spTree>
+    <p:extLst>
+      <p:ext uri="{BB962C8B-B14F-4D97-AF65-F5344CB8AC3E}">
+        <p14:creationId xmlns:p14="http://schemas.microsoft.com/office/powerpoint/2010/main" val="416668991"/>
+      </p:ext>
+    </p:extLst>
+  </p:cSld>
+  <p:clrMapOvr>
+    <a:masterClrMapping/>
+  </p:clrMapOvr>
+</p:notes>
 </file>
 
 <file path=ppt/slideLayouts/slideLayout1.xml><?xml version="1.0" encoding="utf-8"?>
@@ -254,7 +696,7 @@
           <a:p>
             <a:fld id="{1277814B-86DA-1A43-BEBE-BB22F0FBA56B}" type="datetimeFigureOut">
               <a:rPr lang="en-GB" smtClean="0"/>
-              <a:t>30/04/2020</a:t>
+              <a:t>05/05/2020</a:t>
             </a:fld>
             <a:endParaRPr lang="en-GB"/>
           </a:p>
@@ -452,7 +894,7 @@
           <a:p>
             <a:fld id="{1277814B-86DA-1A43-BEBE-BB22F0FBA56B}" type="datetimeFigureOut">
               <a:rPr lang="en-GB" smtClean="0"/>
-              <a:t>30/04/2020</a:t>
+              <a:t>05/05/2020</a:t>
             </a:fld>
             <a:endParaRPr lang="en-GB"/>
           </a:p>
@@ -660,7 +1102,7 @@
           <a:p>
             <a:fld id="{1277814B-86DA-1A43-BEBE-BB22F0FBA56B}" type="datetimeFigureOut">
               <a:rPr lang="en-GB" smtClean="0"/>
-              <a:t>30/04/2020</a:t>
+              <a:t>05/05/2020</a:t>
             </a:fld>
             <a:endParaRPr lang="en-GB"/>
           </a:p>
@@ -858,7 +1300,7 @@
           <a:p>
             <a:fld id="{1277814B-86DA-1A43-BEBE-BB22F0FBA56B}" type="datetimeFigureOut">
               <a:rPr lang="en-GB" smtClean="0"/>
-              <a:t>30/04/2020</a:t>
+              <a:t>05/05/2020</a:t>
             </a:fld>
             <a:endParaRPr lang="en-GB"/>
           </a:p>
@@ -1133,7 +1575,7 @@
           <a:p>
             <a:fld id="{1277814B-86DA-1A43-BEBE-BB22F0FBA56B}" type="datetimeFigureOut">
               <a:rPr lang="en-GB" smtClean="0"/>
-              <a:t>30/04/2020</a:t>
+              <a:t>05/05/2020</a:t>
             </a:fld>
             <a:endParaRPr lang="en-GB"/>
           </a:p>
@@ -1398,7 +1840,7 @@
           <a:p>
             <a:fld id="{1277814B-86DA-1A43-BEBE-BB22F0FBA56B}" type="datetimeFigureOut">
               <a:rPr lang="en-GB" smtClean="0"/>
-              <a:t>30/04/2020</a:t>
+              <a:t>05/05/2020</a:t>
             </a:fld>
             <a:endParaRPr lang="en-GB"/>
           </a:p>
@@ -1810,7 +2252,7 @@
           <a:p>
             <a:fld id="{1277814B-86DA-1A43-BEBE-BB22F0FBA56B}" type="datetimeFigureOut">
               <a:rPr lang="en-GB" smtClean="0"/>
-              <a:t>30/04/2020</a:t>
+              <a:t>05/05/2020</a:t>
             </a:fld>
             <a:endParaRPr lang="en-GB"/>
           </a:p>
@@ -1951,7 +2393,7 @@
           <a:p>
             <a:fld id="{1277814B-86DA-1A43-BEBE-BB22F0FBA56B}" type="datetimeFigureOut">
               <a:rPr lang="en-GB" smtClean="0"/>
-              <a:t>30/04/2020</a:t>
+              <a:t>05/05/2020</a:t>
             </a:fld>
             <a:endParaRPr lang="en-GB"/>
           </a:p>
@@ -2064,7 +2506,7 @@
           <a:p>
             <a:fld id="{1277814B-86DA-1A43-BEBE-BB22F0FBA56B}" type="datetimeFigureOut">
               <a:rPr lang="en-GB" smtClean="0"/>
-              <a:t>30/04/2020</a:t>
+              <a:t>05/05/2020</a:t>
             </a:fld>
             <a:endParaRPr lang="en-GB"/>
           </a:p>
@@ -2375,7 +2817,7 @@
           <a:p>
             <a:fld id="{1277814B-86DA-1A43-BEBE-BB22F0FBA56B}" type="datetimeFigureOut">
               <a:rPr lang="en-GB" smtClean="0"/>
-              <a:t>30/04/2020</a:t>
+              <a:t>05/05/2020</a:t>
             </a:fld>
             <a:endParaRPr lang="en-GB"/>
           </a:p>
@@ -2663,7 +3105,7 @@
           <a:p>
             <a:fld id="{1277814B-86DA-1A43-BEBE-BB22F0FBA56B}" type="datetimeFigureOut">
               <a:rPr lang="en-GB" smtClean="0"/>
-              <a:t>30/04/2020</a:t>
+              <a:t>05/05/2020</a:t>
             </a:fld>
             <a:endParaRPr lang="en-GB"/>
           </a:p>
@@ -2904,7 +3346,7 @@
           <a:p>
             <a:fld id="{1277814B-86DA-1A43-BEBE-BB22F0FBA56B}" type="datetimeFigureOut">
               <a:rPr lang="en-GB" smtClean="0"/>
-              <a:t>30/04/2020</a:t>
+              <a:t>05/05/2020</a:t>
             </a:fld>
             <a:endParaRPr lang="en-GB"/>
           </a:p>
@@ -3305,6 +3747,721 @@
 </file>
 
 <file path=ppt/slides/slide1.xml><?xml version="1.0" encoding="utf-8"?>
+<p:sld xmlns:a="http://schemas.openxmlformats.org/drawingml/2006/main" xmlns:r="http://schemas.openxmlformats.org/officeDocument/2006/relationships" xmlns:p="http://schemas.openxmlformats.org/presentationml/2006/main">
+  <p:cSld>
+    <p:spTree>
+      <p:nvGrpSpPr>
+        <p:cNvPr id="1" name=""/>
+        <p:cNvGrpSpPr/>
+        <p:nvPr/>
+      </p:nvGrpSpPr>
+      <p:grpSpPr>
+        <a:xfrm>
+          <a:off x="0" y="0"/>
+          <a:ext cx="0" cy="0"/>
+          <a:chOff x="0" y="0"/>
+          <a:chExt cx="0" cy="0"/>
+        </a:xfrm>
+      </p:grpSpPr>
+      <p:sp>
+        <p:nvSpPr>
+          <p:cNvPr id="19" name="Rectangle 18">
+            <a:extLst>
+              <a:ext uri="{FF2B5EF4-FFF2-40B4-BE49-F238E27FC236}">
+                <a16:creationId xmlns:a16="http://schemas.microsoft.com/office/drawing/2014/main" id="{35787622-613D-D947-BB16-99D4580FE577}"/>
+              </a:ext>
+            </a:extLst>
+          </p:cNvPr>
+          <p:cNvSpPr/>
+          <p:nvPr/>
+        </p:nvSpPr>
+        <p:spPr>
+          <a:xfrm>
+            <a:off x="6096000" y="0"/>
+            <a:ext cx="6096000" cy="6858000"/>
+          </a:xfrm>
+          <a:prstGeom prst="rect">
+            <a:avLst/>
+          </a:prstGeom>
+          <a:solidFill>
+            <a:schemeClr val="accent2">
+              <a:lumMod val="20000"/>
+              <a:lumOff val="80000"/>
+            </a:schemeClr>
+          </a:solidFill>
+        </p:spPr>
+        <p:style>
+          <a:lnRef idx="2">
+            <a:schemeClr val="accent1">
+              <a:shade val="50000"/>
+            </a:schemeClr>
+          </a:lnRef>
+          <a:fillRef idx="1">
+            <a:schemeClr val="accent1"/>
+          </a:fillRef>
+          <a:effectRef idx="0">
+            <a:schemeClr val="accent1"/>
+          </a:effectRef>
+          <a:fontRef idx="minor">
+            <a:schemeClr val="lt1"/>
+          </a:fontRef>
+        </p:style>
+        <p:txBody>
+          <a:bodyPr rtlCol="0" anchor="t"/>
+          <a:lstStyle/>
+          <a:p>
+            <a:pPr algn="ctr"/>
+            <a:r>
+              <a:rPr lang="en-GB" b="1" dirty="0">
+                <a:solidFill>
+                  <a:schemeClr val="tx1"/>
+                </a:solidFill>
+              </a:rPr>
+              <a:t>Runtime</a:t>
+            </a:r>
+          </a:p>
+        </p:txBody>
+      </p:sp>
+      <p:sp>
+        <p:nvSpPr>
+          <p:cNvPr id="18" name="Rectangle 17">
+            <a:extLst>
+              <a:ext uri="{FF2B5EF4-FFF2-40B4-BE49-F238E27FC236}">
+                <a16:creationId xmlns:a16="http://schemas.microsoft.com/office/drawing/2014/main" id="{50B53993-6635-9447-8282-62CBD9C1EF10}"/>
+              </a:ext>
+            </a:extLst>
+          </p:cNvPr>
+          <p:cNvSpPr/>
+          <p:nvPr/>
+        </p:nvSpPr>
+        <p:spPr>
+          <a:xfrm>
+            <a:off x="0" y="0"/>
+            <a:ext cx="6096000" cy="6858000"/>
+          </a:xfrm>
+          <a:prstGeom prst="rect">
+            <a:avLst/>
+          </a:prstGeom>
+          <a:solidFill>
+            <a:schemeClr val="accent1">
+              <a:lumMod val="20000"/>
+              <a:lumOff val="80000"/>
+            </a:schemeClr>
+          </a:solidFill>
+        </p:spPr>
+        <p:style>
+          <a:lnRef idx="2">
+            <a:schemeClr val="accent1">
+              <a:shade val="50000"/>
+            </a:schemeClr>
+          </a:lnRef>
+          <a:fillRef idx="1">
+            <a:schemeClr val="accent1"/>
+          </a:fillRef>
+          <a:effectRef idx="0">
+            <a:schemeClr val="accent1"/>
+          </a:effectRef>
+          <a:fontRef idx="minor">
+            <a:schemeClr val="lt1"/>
+          </a:fontRef>
+        </p:style>
+        <p:txBody>
+          <a:bodyPr rtlCol="0" anchor="t"/>
+          <a:lstStyle/>
+          <a:p>
+            <a:pPr algn="ctr"/>
+            <a:r>
+              <a:rPr lang="en-GB" b="1" dirty="0">
+                <a:solidFill>
+                  <a:schemeClr val="tx1"/>
+                </a:solidFill>
+              </a:rPr>
+              <a:t>Development</a:t>
+            </a:r>
+          </a:p>
+        </p:txBody>
+      </p:sp>
+      <p:sp>
+        <p:nvSpPr>
+          <p:cNvPr id="4" name="Rectangle 3">
+            <a:extLst>
+              <a:ext uri="{FF2B5EF4-FFF2-40B4-BE49-F238E27FC236}">
+                <a16:creationId xmlns:a16="http://schemas.microsoft.com/office/drawing/2014/main" id="{5E8DD1DD-6D53-BE41-A7D2-A93F55A0ECDE}"/>
+              </a:ext>
+            </a:extLst>
+          </p:cNvPr>
+          <p:cNvSpPr/>
+          <p:nvPr/>
+        </p:nvSpPr>
+        <p:spPr>
+          <a:xfrm>
+            <a:off x="275822" y="4002135"/>
+            <a:ext cx="1113862" cy="1502228"/>
+          </a:xfrm>
+          <a:prstGeom prst="rect">
+            <a:avLst/>
+          </a:prstGeom>
+          <a:solidFill>
+            <a:schemeClr val="accent5"/>
+          </a:solidFill>
+        </p:spPr>
+        <p:style>
+          <a:lnRef idx="2">
+            <a:schemeClr val="accent1">
+              <a:shade val="50000"/>
+            </a:schemeClr>
+          </a:lnRef>
+          <a:fillRef idx="1">
+            <a:schemeClr val="accent1"/>
+          </a:fillRef>
+          <a:effectRef idx="0">
+            <a:schemeClr val="accent1"/>
+          </a:effectRef>
+          <a:fontRef idx="minor">
+            <a:schemeClr val="lt1"/>
+          </a:fontRef>
+        </p:style>
+        <p:txBody>
+          <a:bodyPr rtlCol="0" anchor="ctr"/>
+          <a:lstStyle/>
+          <a:p>
+            <a:pPr algn="ctr"/>
+            <a:r>
+              <a:rPr lang="en-GB" dirty="0"/>
+              <a:t>Java</a:t>
+            </a:r>
+          </a:p>
+        </p:txBody>
+      </p:sp>
+      <p:sp>
+        <p:nvSpPr>
+          <p:cNvPr id="5" name="Rectangle 4">
+            <a:extLst>
+              <a:ext uri="{FF2B5EF4-FFF2-40B4-BE49-F238E27FC236}">
+                <a16:creationId xmlns:a16="http://schemas.microsoft.com/office/drawing/2014/main" id="{9B62EDF2-DEDD-A84C-953D-D4D9F9D44866}"/>
+              </a:ext>
+            </a:extLst>
+          </p:cNvPr>
+          <p:cNvSpPr/>
+          <p:nvPr/>
+        </p:nvSpPr>
+        <p:spPr>
+          <a:xfrm>
+            <a:off x="275823" y="1890306"/>
+            <a:ext cx="1113862" cy="1502228"/>
+          </a:xfrm>
+          <a:prstGeom prst="rect">
+            <a:avLst/>
+          </a:prstGeom>
+          <a:solidFill>
+            <a:schemeClr val="accent2"/>
+          </a:solidFill>
+        </p:spPr>
+        <p:style>
+          <a:lnRef idx="2">
+            <a:schemeClr val="accent1">
+              <a:shade val="50000"/>
+            </a:schemeClr>
+          </a:lnRef>
+          <a:fillRef idx="1">
+            <a:schemeClr val="accent1"/>
+          </a:fillRef>
+          <a:effectRef idx="0">
+            <a:schemeClr val="accent1"/>
+          </a:effectRef>
+          <a:fontRef idx="minor">
+            <a:schemeClr val="lt1"/>
+          </a:fontRef>
+        </p:style>
+        <p:txBody>
+          <a:bodyPr rtlCol="0" anchor="ctr"/>
+          <a:lstStyle/>
+          <a:p>
+            <a:pPr algn="ctr"/>
+            <a:r>
+              <a:rPr lang="en-GB" dirty="0"/>
+              <a:t>Groovy</a:t>
+            </a:r>
+          </a:p>
+        </p:txBody>
+      </p:sp>
+      <p:sp>
+        <p:nvSpPr>
+          <p:cNvPr id="6" name="Rectangle 5">
+            <a:extLst>
+              <a:ext uri="{FF2B5EF4-FFF2-40B4-BE49-F238E27FC236}">
+                <a16:creationId xmlns:a16="http://schemas.microsoft.com/office/drawing/2014/main" id="{845BB00A-C8BD-274E-A6C1-20824DE8B29C}"/>
+              </a:ext>
+            </a:extLst>
+          </p:cNvPr>
+          <p:cNvSpPr/>
+          <p:nvPr/>
+        </p:nvSpPr>
+        <p:spPr>
+          <a:xfrm>
+            <a:off x="275822" y="213907"/>
+            <a:ext cx="1113862" cy="1502228"/>
+          </a:xfrm>
+          <a:prstGeom prst="rect">
+            <a:avLst/>
+          </a:prstGeom>
+          <a:solidFill>
+            <a:schemeClr val="accent4"/>
+          </a:solidFill>
+        </p:spPr>
+        <p:style>
+          <a:lnRef idx="2">
+            <a:schemeClr val="accent1">
+              <a:shade val="50000"/>
+            </a:schemeClr>
+          </a:lnRef>
+          <a:fillRef idx="1">
+            <a:schemeClr val="accent1"/>
+          </a:fillRef>
+          <a:effectRef idx="0">
+            <a:schemeClr val="accent1"/>
+          </a:effectRef>
+          <a:fontRef idx="minor">
+            <a:schemeClr val="lt1"/>
+          </a:fontRef>
+        </p:style>
+        <p:txBody>
+          <a:bodyPr rtlCol="0" anchor="ctr"/>
+          <a:lstStyle/>
+          <a:p>
+            <a:pPr algn="ctr"/>
+            <a:r>
+              <a:rPr lang="en-GB" dirty="0"/>
+              <a:t>Clojure</a:t>
+            </a:r>
+          </a:p>
+        </p:txBody>
+      </p:sp>
+      <p:sp>
+        <p:nvSpPr>
+          <p:cNvPr id="7" name="TextBox 6">
+            <a:extLst>
+              <a:ext uri="{FF2B5EF4-FFF2-40B4-BE49-F238E27FC236}">
+                <a16:creationId xmlns:a16="http://schemas.microsoft.com/office/drawing/2014/main" id="{9B061F5B-3864-B14A-8D4B-DC3040FC4009}"/>
+              </a:ext>
+            </a:extLst>
+          </p:cNvPr>
+          <p:cNvSpPr txBox="1"/>
+          <p:nvPr/>
+        </p:nvSpPr>
+        <p:spPr>
+          <a:xfrm>
+            <a:off x="82628" y="5842337"/>
+            <a:ext cx="1500249" cy="923330"/>
+          </a:xfrm>
+          <a:prstGeom prst="rect">
+            <a:avLst/>
+          </a:prstGeom>
+          <a:noFill/>
+        </p:spPr>
+        <p:txBody>
+          <a:bodyPr wrap="square" rtlCol="0">
+            <a:spAutoFit/>
+          </a:bodyPr>
+          <a:lstStyle/>
+          <a:p>
+            <a:pPr algn="ctr"/>
+            <a:r>
+              <a:rPr lang="en-GB" dirty="0"/>
+              <a:t>Programming Language Source Files</a:t>
+            </a:r>
+          </a:p>
+        </p:txBody>
+      </p:sp>
+      <p:sp>
+        <p:nvSpPr>
+          <p:cNvPr id="8" name="Striped Right Arrow 7">
+            <a:extLst>
+              <a:ext uri="{FF2B5EF4-FFF2-40B4-BE49-F238E27FC236}">
+                <a16:creationId xmlns:a16="http://schemas.microsoft.com/office/drawing/2014/main" id="{284979C2-5CE5-7843-98FA-08F273601F6D}"/>
+              </a:ext>
+            </a:extLst>
+          </p:cNvPr>
+          <p:cNvSpPr/>
+          <p:nvPr/>
+        </p:nvSpPr>
+        <p:spPr>
+          <a:xfrm>
+            <a:off x="1771016" y="1531078"/>
+            <a:ext cx="3084518" cy="2852057"/>
+          </a:xfrm>
+          <a:prstGeom prst="stripedRightArrow">
+            <a:avLst/>
+          </a:prstGeom>
+        </p:spPr>
+        <p:style>
+          <a:lnRef idx="2">
+            <a:schemeClr val="accent1">
+              <a:shade val="50000"/>
+            </a:schemeClr>
+          </a:lnRef>
+          <a:fillRef idx="1">
+            <a:schemeClr val="accent1"/>
+          </a:fillRef>
+          <a:effectRef idx="0">
+            <a:schemeClr val="accent1"/>
+          </a:effectRef>
+          <a:fontRef idx="minor">
+            <a:schemeClr val="lt1"/>
+          </a:fontRef>
+        </p:style>
+        <p:txBody>
+          <a:bodyPr rtlCol="0" anchor="ctr"/>
+          <a:lstStyle/>
+          <a:p>
+            <a:pPr algn="ctr"/>
+            <a:endParaRPr lang="en-GB"/>
+          </a:p>
+        </p:txBody>
+      </p:sp>
+      <p:sp>
+        <p:nvSpPr>
+          <p:cNvPr id="9" name="TextBox 8">
+            <a:extLst>
+              <a:ext uri="{FF2B5EF4-FFF2-40B4-BE49-F238E27FC236}">
+                <a16:creationId xmlns:a16="http://schemas.microsoft.com/office/drawing/2014/main" id="{A457B754-1DCF-6343-B296-5E13ED82B5EE}"/>
+              </a:ext>
+            </a:extLst>
+          </p:cNvPr>
+          <p:cNvSpPr txBox="1"/>
+          <p:nvPr/>
+        </p:nvSpPr>
+        <p:spPr>
+          <a:xfrm>
+            <a:off x="2099769" y="6119336"/>
+            <a:ext cx="2427011" cy="369332"/>
+          </a:xfrm>
+          <a:prstGeom prst="rect">
+            <a:avLst/>
+          </a:prstGeom>
+          <a:noFill/>
+        </p:spPr>
+        <p:txBody>
+          <a:bodyPr wrap="none" rtlCol="0">
+            <a:spAutoFit/>
+          </a:bodyPr>
+          <a:lstStyle/>
+          <a:p>
+            <a:pPr algn="ctr"/>
+            <a:r>
+              <a:rPr lang="en-GB" dirty="0"/>
+              <a:t>Compiled into Bytecode</a:t>
+            </a:r>
+          </a:p>
+        </p:txBody>
+      </p:sp>
+      <p:sp>
+        <p:nvSpPr>
+          <p:cNvPr id="10" name="Rectangle 9">
+            <a:extLst>
+              <a:ext uri="{FF2B5EF4-FFF2-40B4-BE49-F238E27FC236}">
+                <a16:creationId xmlns:a16="http://schemas.microsoft.com/office/drawing/2014/main" id="{DB581959-A855-D84C-A200-8772895B124B}"/>
+              </a:ext>
+            </a:extLst>
+          </p:cNvPr>
+          <p:cNvSpPr/>
+          <p:nvPr/>
+        </p:nvSpPr>
+        <p:spPr>
+          <a:xfrm>
+            <a:off x="5530105" y="213907"/>
+            <a:ext cx="1113862" cy="5290456"/>
+          </a:xfrm>
+          <a:prstGeom prst="rect">
+            <a:avLst/>
+          </a:prstGeom>
+          <a:solidFill>
+            <a:schemeClr val="accent6"/>
+          </a:solidFill>
+        </p:spPr>
+        <p:style>
+          <a:lnRef idx="2">
+            <a:schemeClr val="accent1">
+              <a:shade val="50000"/>
+            </a:schemeClr>
+          </a:lnRef>
+          <a:fillRef idx="1">
+            <a:schemeClr val="accent1"/>
+          </a:fillRef>
+          <a:effectRef idx="0">
+            <a:schemeClr val="accent1"/>
+          </a:effectRef>
+          <a:fontRef idx="minor">
+            <a:schemeClr val="lt1"/>
+          </a:fontRef>
+        </p:style>
+        <p:txBody>
+          <a:bodyPr rtlCol="0" anchor="ctr"/>
+          <a:lstStyle/>
+          <a:p>
+            <a:pPr algn="ctr"/>
+            <a:r>
+              <a:rPr lang="en-GB" dirty="0"/>
+              <a:t>Bytecode</a:t>
+            </a:r>
+          </a:p>
+        </p:txBody>
+      </p:sp>
+      <p:sp>
+        <p:nvSpPr>
+          <p:cNvPr id="11" name="Striped Right Arrow 10">
+            <a:extLst>
+              <a:ext uri="{FF2B5EF4-FFF2-40B4-BE49-F238E27FC236}">
+                <a16:creationId xmlns:a16="http://schemas.microsoft.com/office/drawing/2014/main" id="{3A0D8243-A559-3A46-BD93-3D78C5CBAA46}"/>
+              </a:ext>
+            </a:extLst>
+          </p:cNvPr>
+          <p:cNvSpPr/>
+          <p:nvPr/>
+        </p:nvSpPr>
+        <p:spPr>
+          <a:xfrm>
+            <a:off x="7318538" y="1531077"/>
+            <a:ext cx="3084518" cy="2852057"/>
+          </a:xfrm>
+          <a:prstGeom prst="stripedRightArrow">
+            <a:avLst/>
+          </a:prstGeom>
+        </p:spPr>
+        <p:style>
+          <a:lnRef idx="2">
+            <a:schemeClr val="accent1">
+              <a:shade val="50000"/>
+            </a:schemeClr>
+          </a:lnRef>
+          <a:fillRef idx="1">
+            <a:schemeClr val="accent1"/>
+          </a:fillRef>
+          <a:effectRef idx="0">
+            <a:schemeClr val="accent1"/>
+          </a:effectRef>
+          <a:fontRef idx="minor">
+            <a:schemeClr val="lt1"/>
+          </a:fontRef>
+        </p:style>
+        <p:txBody>
+          <a:bodyPr rtlCol="0" anchor="ctr"/>
+          <a:lstStyle/>
+          <a:p>
+            <a:pPr algn="ctr"/>
+            <a:endParaRPr lang="en-GB"/>
+          </a:p>
+        </p:txBody>
+      </p:sp>
+      <p:sp>
+        <p:nvSpPr>
+          <p:cNvPr id="12" name="Rectangle 11">
+            <a:extLst>
+              <a:ext uri="{FF2B5EF4-FFF2-40B4-BE49-F238E27FC236}">
+                <a16:creationId xmlns:a16="http://schemas.microsoft.com/office/drawing/2014/main" id="{53BA47BC-C067-8B40-AE2B-3241A8603069}"/>
+              </a:ext>
+            </a:extLst>
+          </p:cNvPr>
+          <p:cNvSpPr/>
+          <p:nvPr/>
+        </p:nvSpPr>
+        <p:spPr>
+          <a:xfrm>
+            <a:off x="10784388" y="213907"/>
+            <a:ext cx="1113862" cy="5290456"/>
+          </a:xfrm>
+          <a:prstGeom prst="rect">
+            <a:avLst/>
+          </a:prstGeom>
+          <a:solidFill>
+            <a:schemeClr val="tx2"/>
+          </a:solidFill>
+        </p:spPr>
+        <p:style>
+          <a:lnRef idx="2">
+            <a:schemeClr val="accent1">
+              <a:shade val="50000"/>
+            </a:schemeClr>
+          </a:lnRef>
+          <a:fillRef idx="1">
+            <a:schemeClr val="accent1"/>
+          </a:fillRef>
+          <a:effectRef idx="0">
+            <a:schemeClr val="accent1"/>
+          </a:effectRef>
+          <a:fontRef idx="minor">
+            <a:schemeClr val="lt1"/>
+          </a:fontRef>
+        </p:style>
+        <p:txBody>
+          <a:bodyPr rtlCol="0" anchor="ctr"/>
+          <a:lstStyle/>
+          <a:p>
+            <a:pPr algn="ctr"/>
+            <a:r>
+              <a:rPr lang="en-GB" dirty="0"/>
+              <a:t>Machine Code</a:t>
+            </a:r>
+          </a:p>
+        </p:txBody>
+      </p:sp>
+      <p:sp>
+        <p:nvSpPr>
+          <p:cNvPr id="14" name="TextBox 13">
+            <a:extLst>
+              <a:ext uri="{FF2B5EF4-FFF2-40B4-BE49-F238E27FC236}">
+                <a16:creationId xmlns:a16="http://schemas.microsoft.com/office/drawing/2014/main" id="{ED2CB9A4-70D6-0B4A-A84E-394CF8BD0C99}"/>
+              </a:ext>
+            </a:extLst>
+          </p:cNvPr>
+          <p:cNvSpPr txBox="1"/>
+          <p:nvPr/>
+        </p:nvSpPr>
+        <p:spPr>
+          <a:xfrm>
+            <a:off x="661070" y="3479495"/>
+            <a:ext cx="343364" cy="369332"/>
+          </a:xfrm>
+          <a:prstGeom prst="rect">
+            <a:avLst/>
+          </a:prstGeom>
+          <a:noFill/>
+        </p:spPr>
+        <p:txBody>
+          <a:bodyPr wrap="none" rtlCol="0">
+            <a:spAutoFit/>
+          </a:bodyPr>
+          <a:lstStyle/>
+          <a:p>
+            <a:r>
+              <a:rPr lang="en-GB" dirty="0"/>
+              <a:t>…</a:t>
+            </a:r>
+          </a:p>
+        </p:txBody>
+      </p:sp>
+      <p:sp>
+        <p:nvSpPr>
+          <p:cNvPr id="15" name="TextBox 14">
+            <a:extLst>
+              <a:ext uri="{FF2B5EF4-FFF2-40B4-BE49-F238E27FC236}">
+                <a16:creationId xmlns:a16="http://schemas.microsoft.com/office/drawing/2014/main" id="{289E6F53-5EEF-D142-AED7-9FDEB7A54254}"/>
+              </a:ext>
+            </a:extLst>
+          </p:cNvPr>
+          <p:cNvSpPr txBox="1"/>
+          <p:nvPr/>
+        </p:nvSpPr>
+        <p:spPr>
+          <a:xfrm>
+            <a:off x="5336911" y="5842337"/>
+            <a:ext cx="1500249" cy="923330"/>
+          </a:xfrm>
+          <a:prstGeom prst="rect">
+            <a:avLst/>
+          </a:prstGeom>
+          <a:noFill/>
+        </p:spPr>
+        <p:txBody>
+          <a:bodyPr wrap="square" rtlCol="0">
+            <a:spAutoFit/>
+          </a:bodyPr>
+          <a:lstStyle/>
+          <a:p>
+            <a:pPr algn="ctr"/>
+            <a:r>
+              <a:rPr lang="en-GB" dirty="0"/>
+              <a:t>Machine independent Bytecode</a:t>
+            </a:r>
+          </a:p>
+        </p:txBody>
+      </p:sp>
+      <p:sp>
+        <p:nvSpPr>
+          <p:cNvPr id="16" name="TextBox 15">
+            <a:extLst>
+              <a:ext uri="{FF2B5EF4-FFF2-40B4-BE49-F238E27FC236}">
+                <a16:creationId xmlns:a16="http://schemas.microsoft.com/office/drawing/2014/main" id="{E47010BE-6751-9447-A3BD-E7954911371B}"/>
+              </a:ext>
+            </a:extLst>
+          </p:cNvPr>
+          <p:cNvSpPr txBox="1"/>
+          <p:nvPr/>
+        </p:nvSpPr>
+        <p:spPr>
+          <a:xfrm>
+            <a:off x="7620854" y="5980836"/>
+            <a:ext cx="2479886" cy="646331"/>
+          </a:xfrm>
+          <a:prstGeom prst="rect">
+            <a:avLst/>
+          </a:prstGeom>
+          <a:noFill/>
+        </p:spPr>
+        <p:txBody>
+          <a:bodyPr wrap="square" rtlCol="0">
+            <a:spAutoFit/>
+          </a:bodyPr>
+          <a:lstStyle/>
+          <a:p>
+            <a:pPr algn="ctr"/>
+            <a:r>
+              <a:rPr lang="en-GB" dirty="0"/>
+              <a:t>Interpreted by the JIT (Just in Time Compiler)</a:t>
+            </a:r>
+          </a:p>
+        </p:txBody>
+      </p:sp>
+      <p:sp>
+        <p:nvSpPr>
+          <p:cNvPr id="17" name="TextBox 16">
+            <a:extLst>
+              <a:ext uri="{FF2B5EF4-FFF2-40B4-BE49-F238E27FC236}">
+                <a16:creationId xmlns:a16="http://schemas.microsoft.com/office/drawing/2014/main" id="{4B4FAB5E-19C5-CD4B-A908-51A5929E82A6}"/>
+              </a:ext>
+            </a:extLst>
+          </p:cNvPr>
+          <p:cNvSpPr txBox="1"/>
+          <p:nvPr/>
+        </p:nvSpPr>
+        <p:spPr>
+          <a:xfrm>
+            <a:off x="10454785" y="5830721"/>
+            <a:ext cx="1773067" cy="923330"/>
+          </a:xfrm>
+          <a:prstGeom prst="rect">
+            <a:avLst/>
+          </a:prstGeom>
+          <a:noFill/>
+        </p:spPr>
+        <p:txBody>
+          <a:bodyPr wrap="square" rtlCol="0">
+            <a:spAutoFit/>
+          </a:bodyPr>
+          <a:lstStyle/>
+          <a:p>
+            <a:pPr algn="ctr"/>
+            <a:r>
+              <a:rPr lang="en-GB" dirty="0"/>
+              <a:t>Machine dependent executable code</a:t>
+            </a:r>
+          </a:p>
+        </p:txBody>
+      </p:sp>
+    </p:spTree>
+    <p:extLst>
+      <p:ext uri="{BB962C8B-B14F-4D97-AF65-F5344CB8AC3E}">
+        <p14:creationId xmlns:p14="http://schemas.microsoft.com/office/powerpoint/2010/main" val="839687477"/>
+      </p:ext>
+    </p:extLst>
+  </p:cSld>
+  <p:clrMapOvr>
+    <a:masterClrMapping/>
+  </p:clrMapOvr>
+</p:sld>
+</file>
+
+<file path=ppt/slides/slide2.xml><?xml version="1.0" encoding="utf-8"?>
 <p:sld xmlns:a="http://schemas.openxmlformats.org/drawingml/2006/main" xmlns:r="http://schemas.openxmlformats.org/officeDocument/2006/relationships" xmlns:p="http://schemas.openxmlformats.org/presentationml/2006/main">
   <p:cSld>
     <p:spTree>
@@ -4133,4 +5290,299 @@
     </a:ext>
   </a:extLst>
 </a:theme>
+</file>
+
+<file path=ppt/theme/theme2.xml><?xml version="1.0" encoding="utf-8"?>
+<a:theme xmlns:a="http://schemas.openxmlformats.org/drawingml/2006/main" name="Office Theme">
+  <a:themeElements>
+    <a:clrScheme name="Office">
+      <a:dk1>
+        <a:sysClr val="windowText" lastClr="000000"/>
+      </a:dk1>
+      <a:lt1>
+        <a:sysClr val="window" lastClr="FFFFFF"/>
+      </a:lt1>
+      <a:dk2>
+        <a:srgbClr val="44546A"/>
+      </a:dk2>
+      <a:lt2>
+        <a:srgbClr val="E7E6E6"/>
+      </a:lt2>
+      <a:accent1>
+        <a:srgbClr val="4472C4"/>
+      </a:accent1>
+      <a:accent2>
+        <a:srgbClr val="ED7D31"/>
+      </a:accent2>
+      <a:accent3>
+        <a:srgbClr val="A5A5A5"/>
+      </a:accent3>
+      <a:accent4>
+        <a:srgbClr val="FFC000"/>
+      </a:accent4>
+      <a:accent5>
+        <a:srgbClr val="5B9BD5"/>
+      </a:accent5>
+      <a:accent6>
+        <a:srgbClr val="70AD47"/>
+      </a:accent6>
+      <a:hlink>
+        <a:srgbClr val="0563C1"/>
+      </a:hlink>
+      <a:folHlink>
+        <a:srgbClr val="954F72"/>
+      </a:folHlink>
+    </a:clrScheme>
+    <a:fontScheme name="Office">
+      <a:majorFont>
+        <a:latin typeface="Calibri Light" panose="020F0302020204030204"/>
+        <a:ea typeface=""/>
+        <a:cs typeface=""/>
+        <a:font script="Jpan" typeface="游ゴシック Light"/>
+        <a:font script="Hang" typeface="맑은 고딕"/>
+        <a:font script="Hans" typeface="等线 Light"/>
+        <a:font script="Hant" typeface="新細明體"/>
+        <a:font script="Arab" typeface="Times New Roman"/>
+        <a:font script="Hebr" typeface="Times New Roman"/>
+        <a:font script="Thai" typeface="Angsana New"/>
+        <a:font script="Ethi" typeface="Nyala"/>
+        <a:font script="Beng" typeface="Vrinda"/>
+        <a:font script="Gujr" typeface="Shruti"/>
+        <a:font script="Khmr" typeface="MoolBoran"/>
+        <a:font script="Knda" typeface="Tunga"/>
+        <a:font script="Guru" typeface="Raavi"/>
+        <a:font script="Cans" typeface="Euphemia"/>
+        <a:font script="Cher" typeface="Plantagenet Cherokee"/>
+        <a:font script="Yiii" typeface="Microsoft Yi Baiti"/>
+        <a:font script="Tibt" typeface="Microsoft Himalaya"/>
+        <a:font script="Thaa" typeface="MV Boli"/>
+        <a:font script="Deva" typeface="Mangal"/>
+        <a:font script="Telu" typeface="Gautami"/>
+        <a:font script="Taml" typeface="Latha"/>
+        <a:font script="Syrc" typeface="Estrangelo Edessa"/>
+        <a:font script="Orya" typeface="Kalinga"/>
+        <a:font script="Mlym" typeface="Kartika"/>
+        <a:font script="Laoo" typeface="DokChampa"/>
+        <a:font script="Sinh" typeface="Iskoola Pota"/>
+        <a:font script="Mong" typeface="Mongolian Baiti"/>
+        <a:font script="Viet" typeface="Times New Roman"/>
+        <a:font script="Uigh" typeface="Microsoft Uighur"/>
+        <a:font script="Geor" typeface="Sylfaen"/>
+        <a:font script="Armn" typeface="Arial"/>
+        <a:font script="Bugi" typeface="Leelawadee UI"/>
+        <a:font script="Bopo" typeface="Microsoft JhengHei"/>
+        <a:font script="Java" typeface="Javanese Text"/>
+        <a:font script="Lisu" typeface="Segoe UI"/>
+        <a:font script="Mymr" typeface="Myanmar Text"/>
+        <a:font script="Nkoo" typeface="Ebrima"/>
+        <a:font script="Olck" typeface="Nirmala UI"/>
+        <a:font script="Osma" typeface="Ebrima"/>
+        <a:font script="Phag" typeface="Phagspa"/>
+        <a:font script="Syrn" typeface="Estrangelo Edessa"/>
+        <a:font script="Syrj" typeface="Estrangelo Edessa"/>
+        <a:font script="Syre" typeface="Estrangelo Edessa"/>
+        <a:font script="Sora" typeface="Nirmala UI"/>
+        <a:font script="Tale" typeface="Microsoft Tai Le"/>
+        <a:font script="Talu" typeface="Microsoft New Tai Lue"/>
+        <a:font script="Tfng" typeface="Ebrima"/>
+      </a:majorFont>
+      <a:minorFont>
+        <a:latin typeface="Calibri" panose="020F0502020204030204"/>
+        <a:ea typeface=""/>
+        <a:cs typeface=""/>
+        <a:font script="Jpan" typeface="游ゴシック"/>
+        <a:font script="Hang" typeface="맑은 고딕"/>
+        <a:font script="Hans" typeface="等线"/>
+        <a:font script="Hant" typeface="新細明體"/>
+        <a:font script="Arab" typeface="Arial"/>
+        <a:font script="Hebr" typeface="Arial"/>
+        <a:font script="Thai" typeface="Cordia New"/>
+        <a:font script="Ethi" typeface="Nyala"/>
+        <a:font script="Beng" typeface="Vrinda"/>
+        <a:font script="Gujr" typeface="Shruti"/>
+        <a:font script="Khmr" typeface="DaunPenh"/>
+        <a:font script="Knda" typeface="Tunga"/>
+        <a:font script="Guru" typeface="Raavi"/>
+        <a:font script="Cans" typeface="Euphemia"/>
+        <a:font script="Cher" typeface="Plantagenet Cherokee"/>
+        <a:font script="Yiii" typeface="Microsoft Yi Baiti"/>
+        <a:font script="Tibt" typeface="Microsoft Himalaya"/>
+        <a:font script="Thaa" typeface="MV Boli"/>
+        <a:font script="Deva" typeface="Mangal"/>
+        <a:font script="Telu" typeface="Gautami"/>
+        <a:font script="Taml" typeface="Latha"/>
+        <a:font script="Syrc" typeface="Estrangelo Edessa"/>
+        <a:font script="Orya" typeface="Kalinga"/>
+        <a:font script="Mlym" typeface="Kartika"/>
+        <a:font script="Laoo" typeface="DokChampa"/>
+        <a:font script="Sinh" typeface="Iskoola Pota"/>
+        <a:font script="Mong" typeface="Mongolian Baiti"/>
+        <a:font script="Viet" typeface="Arial"/>
+        <a:font script="Uigh" typeface="Microsoft Uighur"/>
+        <a:font script="Geor" typeface="Sylfaen"/>
+        <a:font script="Armn" typeface="Arial"/>
+        <a:font script="Bugi" typeface="Leelawadee UI"/>
+        <a:font script="Bopo" typeface="Microsoft JhengHei"/>
+        <a:font script="Java" typeface="Javanese Text"/>
+        <a:font script="Lisu" typeface="Segoe UI"/>
+        <a:font script="Mymr" typeface="Myanmar Text"/>
+        <a:font script="Nkoo" typeface="Ebrima"/>
+        <a:font script="Olck" typeface="Nirmala UI"/>
+        <a:font script="Osma" typeface="Ebrima"/>
+        <a:font script="Phag" typeface="Phagspa"/>
+        <a:font script="Syrn" typeface="Estrangelo Edessa"/>
+        <a:font script="Syrj" typeface="Estrangelo Edessa"/>
+        <a:font script="Syre" typeface="Estrangelo Edessa"/>
+        <a:font script="Sora" typeface="Nirmala UI"/>
+        <a:font script="Tale" typeface="Microsoft Tai Le"/>
+        <a:font script="Talu" typeface="Microsoft New Tai Lue"/>
+        <a:font script="Tfng" typeface="Ebrima"/>
+      </a:minorFont>
+    </a:fontScheme>
+    <a:fmtScheme name="Office">
+      <a:fillStyleLst>
+        <a:solidFill>
+          <a:schemeClr val="phClr"/>
+        </a:solidFill>
+        <a:gradFill rotWithShape="1">
+          <a:gsLst>
+            <a:gs pos="0">
+              <a:schemeClr val="phClr">
+                <a:lumMod val="110000"/>
+                <a:satMod val="105000"/>
+                <a:tint val="67000"/>
+              </a:schemeClr>
+            </a:gs>
+            <a:gs pos="50000">
+              <a:schemeClr val="phClr">
+                <a:lumMod val="105000"/>
+                <a:satMod val="103000"/>
+                <a:tint val="73000"/>
+              </a:schemeClr>
+            </a:gs>
+            <a:gs pos="100000">
+              <a:schemeClr val="phClr">
+                <a:lumMod val="105000"/>
+                <a:satMod val="109000"/>
+                <a:tint val="81000"/>
+              </a:schemeClr>
+            </a:gs>
+          </a:gsLst>
+          <a:lin ang="5400000" scaled="0"/>
+        </a:gradFill>
+        <a:gradFill rotWithShape="1">
+          <a:gsLst>
+            <a:gs pos="0">
+              <a:schemeClr val="phClr">
+                <a:satMod val="103000"/>
+                <a:lumMod val="102000"/>
+                <a:tint val="94000"/>
+              </a:schemeClr>
+            </a:gs>
+            <a:gs pos="50000">
+              <a:schemeClr val="phClr">
+                <a:satMod val="110000"/>
+                <a:lumMod val="100000"/>
+                <a:shade val="100000"/>
+              </a:schemeClr>
+            </a:gs>
+            <a:gs pos="100000">
+              <a:schemeClr val="phClr">
+                <a:lumMod val="99000"/>
+                <a:satMod val="120000"/>
+                <a:shade val="78000"/>
+              </a:schemeClr>
+            </a:gs>
+          </a:gsLst>
+          <a:lin ang="5400000" scaled="0"/>
+        </a:gradFill>
+      </a:fillStyleLst>
+      <a:lnStyleLst>
+        <a:ln w="6350" cap="flat" cmpd="sng" algn="ctr">
+          <a:solidFill>
+            <a:schemeClr val="phClr"/>
+          </a:solidFill>
+          <a:prstDash val="solid"/>
+          <a:miter lim="800000"/>
+        </a:ln>
+        <a:ln w="12700" cap="flat" cmpd="sng" algn="ctr">
+          <a:solidFill>
+            <a:schemeClr val="phClr"/>
+          </a:solidFill>
+          <a:prstDash val="solid"/>
+          <a:miter lim="800000"/>
+        </a:ln>
+        <a:ln w="19050" cap="flat" cmpd="sng" algn="ctr">
+          <a:solidFill>
+            <a:schemeClr val="phClr"/>
+          </a:solidFill>
+          <a:prstDash val="solid"/>
+          <a:miter lim="800000"/>
+        </a:ln>
+      </a:lnStyleLst>
+      <a:effectStyleLst>
+        <a:effectStyle>
+          <a:effectLst/>
+        </a:effectStyle>
+        <a:effectStyle>
+          <a:effectLst/>
+        </a:effectStyle>
+        <a:effectStyle>
+          <a:effectLst>
+            <a:outerShdw blurRad="57150" dist="19050" dir="5400000" algn="ctr" rotWithShape="0">
+              <a:srgbClr val="000000">
+                <a:alpha val="63000"/>
+              </a:srgbClr>
+            </a:outerShdw>
+          </a:effectLst>
+        </a:effectStyle>
+      </a:effectStyleLst>
+      <a:bgFillStyleLst>
+        <a:solidFill>
+          <a:schemeClr val="phClr"/>
+        </a:solidFill>
+        <a:solidFill>
+          <a:schemeClr val="phClr">
+            <a:tint val="95000"/>
+            <a:satMod val="170000"/>
+          </a:schemeClr>
+        </a:solidFill>
+        <a:gradFill rotWithShape="1">
+          <a:gsLst>
+            <a:gs pos="0">
+              <a:schemeClr val="phClr">
+                <a:tint val="93000"/>
+                <a:satMod val="150000"/>
+                <a:shade val="98000"/>
+                <a:lumMod val="102000"/>
+              </a:schemeClr>
+            </a:gs>
+            <a:gs pos="50000">
+              <a:schemeClr val="phClr">
+                <a:tint val="98000"/>
+                <a:satMod val="130000"/>
+                <a:shade val="90000"/>
+                <a:lumMod val="103000"/>
+              </a:schemeClr>
+            </a:gs>
+            <a:gs pos="100000">
+              <a:schemeClr val="phClr">
+                <a:shade val="63000"/>
+                <a:satMod val="120000"/>
+              </a:schemeClr>
+            </a:gs>
+          </a:gsLst>
+          <a:lin ang="5400000" scaled="0"/>
+        </a:gradFill>
+      </a:bgFillStyleLst>
+    </a:fmtScheme>
+  </a:themeElements>
+  <a:objectDefaults/>
+  <a:extraClrSchemeLst/>
+  <a:extLst>
+    <a:ext uri="{05A4C25C-085E-4340-85A3-A5531E510DB2}">
+      <thm15:themeFamily xmlns:thm15="http://schemas.microsoft.com/office/thememl/2012/main" name="Office Theme" id="{62F939B6-93AF-4DB8-9C6B-D6C7DFDC589F}" vid="{4A3C46E8-61CC-4603-A589-7422A47A8E4A}"/>
+    </a:ext>
+  </a:extLst>
+</a:theme>
 </file>
</xml_diff>

<commit_message>
Add stack & heap examples
</commit_message>
<xml_diff>
--- a/assets/images/Images.pptx
+++ b/assets/images/Images.pptx
@@ -5,11 +5,12 @@
     <p:sldMasterId id="2147483648" r:id="rId1"/>
   </p:sldMasterIdLst>
   <p:notesMasterIdLst>
-    <p:notesMasterId r:id="rId4"/>
+    <p:notesMasterId r:id="rId5"/>
   </p:notesMasterIdLst>
   <p:sldIdLst>
     <p:sldId id="257" r:id="rId2"/>
-    <p:sldId id="256" r:id="rId3"/>
+    <p:sldId id="258" r:id="rId3"/>
+    <p:sldId id="256" r:id="rId4"/>
   </p:sldIdLst>
   <p:sldSz cx="12192000" cy="6858000"/>
   <p:notesSz cx="6858000" cy="9144000"/>
@@ -109,6 +110,25 @@
     </a:lvl9pPr>
   </p:defaultTextStyle>
   <p:extLst>
+    <p:ext uri="{521415D9-36F7-43E2-AB2F-B90AF26B5E84}">
+      <p14:sectionLst xmlns:p14="http://schemas.microsoft.com/office/powerpoint/2010/main">
+        <p14:section name="Primer" id="{C5D8FC65-3446-DB4E-B486-2285C2608FA3}">
+          <p14:sldIdLst>
+            <p14:sldId id="257"/>
+          </p14:sldIdLst>
+        </p14:section>
+        <p14:section name="Data Types" id="{D2EF745B-DF6F-1149-A956-99F8C5570964}">
+          <p14:sldIdLst>
+            <p14:sldId id="258"/>
+          </p14:sldIdLst>
+        </p14:section>
+        <p14:section name="Testing" id="{064BBB82-ADB6-E844-9D9E-44CD43DCBE9F}">
+          <p14:sldIdLst>
+            <p14:sldId id="256"/>
+          </p14:sldIdLst>
+        </p14:section>
+      </p14:sectionLst>
+    </p:ext>
     <p:ext uri="{EFAFB233-063F-42B5-8137-9DF3F51BA10A}">
       <p15:sldGuideLst xmlns:p15="http://schemas.microsoft.com/office/powerpoint/2012/main"/>
     </p:ext>
@@ -198,7 +218,7 @@
           <a:p>
             <a:fld id="{F0373C07-0034-D84F-B0CB-1249B408AEAD}" type="datetimeFigureOut">
               <a:rPr lang="en-GB" smtClean="0"/>
-              <a:t>05/05/2020</a:t>
+              <a:t>06/05/2020</a:t>
             </a:fld>
             <a:endParaRPr lang="en-GB"/>
           </a:p>
@@ -696,7 +716,7 @@
           <a:p>
             <a:fld id="{1277814B-86DA-1A43-BEBE-BB22F0FBA56B}" type="datetimeFigureOut">
               <a:rPr lang="en-GB" smtClean="0"/>
-              <a:t>05/05/2020</a:t>
+              <a:t>06/05/2020</a:t>
             </a:fld>
             <a:endParaRPr lang="en-GB"/>
           </a:p>
@@ -894,7 +914,7 @@
           <a:p>
             <a:fld id="{1277814B-86DA-1A43-BEBE-BB22F0FBA56B}" type="datetimeFigureOut">
               <a:rPr lang="en-GB" smtClean="0"/>
-              <a:t>05/05/2020</a:t>
+              <a:t>06/05/2020</a:t>
             </a:fld>
             <a:endParaRPr lang="en-GB"/>
           </a:p>
@@ -1102,7 +1122,7 @@
           <a:p>
             <a:fld id="{1277814B-86DA-1A43-BEBE-BB22F0FBA56B}" type="datetimeFigureOut">
               <a:rPr lang="en-GB" smtClean="0"/>
-              <a:t>05/05/2020</a:t>
+              <a:t>06/05/2020</a:t>
             </a:fld>
             <a:endParaRPr lang="en-GB"/>
           </a:p>
@@ -1300,7 +1320,7 @@
           <a:p>
             <a:fld id="{1277814B-86DA-1A43-BEBE-BB22F0FBA56B}" type="datetimeFigureOut">
               <a:rPr lang="en-GB" smtClean="0"/>
-              <a:t>05/05/2020</a:t>
+              <a:t>06/05/2020</a:t>
             </a:fld>
             <a:endParaRPr lang="en-GB"/>
           </a:p>
@@ -1575,7 +1595,7 @@
           <a:p>
             <a:fld id="{1277814B-86DA-1A43-BEBE-BB22F0FBA56B}" type="datetimeFigureOut">
               <a:rPr lang="en-GB" smtClean="0"/>
-              <a:t>05/05/2020</a:t>
+              <a:t>06/05/2020</a:t>
             </a:fld>
             <a:endParaRPr lang="en-GB"/>
           </a:p>
@@ -1840,7 +1860,7 @@
           <a:p>
             <a:fld id="{1277814B-86DA-1A43-BEBE-BB22F0FBA56B}" type="datetimeFigureOut">
               <a:rPr lang="en-GB" smtClean="0"/>
-              <a:t>05/05/2020</a:t>
+              <a:t>06/05/2020</a:t>
             </a:fld>
             <a:endParaRPr lang="en-GB"/>
           </a:p>
@@ -2252,7 +2272,7 @@
           <a:p>
             <a:fld id="{1277814B-86DA-1A43-BEBE-BB22F0FBA56B}" type="datetimeFigureOut">
               <a:rPr lang="en-GB" smtClean="0"/>
-              <a:t>05/05/2020</a:t>
+              <a:t>06/05/2020</a:t>
             </a:fld>
             <a:endParaRPr lang="en-GB"/>
           </a:p>
@@ -2393,7 +2413,7 @@
           <a:p>
             <a:fld id="{1277814B-86DA-1A43-BEBE-BB22F0FBA56B}" type="datetimeFigureOut">
               <a:rPr lang="en-GB" smtClean="0"/>
-              <a:t>05/05/2020</a:t>
+              <a:t>06/05/2020</a:t>
             </a:fld>
             <a:endParaRPr lang="en-GB"/>
           </a:p>
@@ -2506,7 +2526,7 @@
           <a:p>
             <a:fld id="{1277814B-86DA-1A43-BEBE-BB22F0FBA56B}" type="datetimeFigureOut">
               <a:rPr lang="en-GB" smtClean="0"/>
-              <a:t>05/05/2020</a:t>
+              <a:t>06/05/2020</a:t>
             </a:fld>
             <a:endParaRPr lang="en-GB"/>
           </a:p>
@@ -2817,7 +2837,7 @@
           <a:p>
             <a:fld id="{1277814B-86DA-1A43-BEBE-BB22F0FBA56B}" type="datetimeFigureOut">
               <a:rPr lang="en-GB" smtClean="0"/>
-              <a:t>05/05/2020</a:t>
+              <a:t>06/05/2020</a:t>
             </a:fld>
             <a:endParaRPr lang="en-GB"/>
           </a:p>
@@ -3105,7 +3125,7 @@
           <a:p>
             <a:fld id="{1277814B-86DA-1A43-BEBE-BB22F0FBA56B}" type="datetimeFigureOut">
               <a:rPr lang="en-GB" smtClean="0"/>
-              <a:t>05/05/2020</a:t>
+              <a:t>06/05/2020</a:t>
             </a:fld>
             <a:endParaRPr lang="en-GB"/>
           </a:p>
@@ -3346,7 +3366,7 @@
           <a:p>
             <a:fld id="{1277814B-86DA-1A43-BEBE-BB22F0FBA56B}" type="datetimeFigureOut">
               <a:rPr lang="en-GB" smtClean="0"/>
-              <a:t>05/05/2020</a:t>
+              <a:t>06/05/2020</a:t>
             </a:fld>
             <a:endParaRPr lang="en-GB"/>
           </a:p>
@@ -4462,6 +4482,529 @@
 </file>
 
 <file path=ppt/slides/slide2.xml><?xml version="1.0" encoding="utf-8"?>
+<p:sld xmlns:a="http://schemas.openxmlformats.org/drawingml/2006/main" xmlns:r="http://schemas.openxmlformats.org/officeDocument/2006/relationships" xmlns:p="http://schemas.openxmlformats.org/presentationml/2006/main">
+  <p:cSld>
+    <p:spTree>
+      <p:nvGrpSpPr>
+        <p:cNvPr id="1" name=""/>
+        <p:cNvGrpSpPr/>
+        <p:nvPr/>
+      </p:nvGrpSpPr>
+      <p:grpSpPr>
+        <a:xfrm>
+          <a:off x="0" y="0"/>
+          <a:ext cx="0" cy="0"/>
+          <a:chOff x="0" y="0"/>
+          <a:chExt cx="0" cy="0"/>
+        </a:xfrm>
+      </p:grpSpPr>
+      <p:sp>
+        <p:nvSpPr>
+          <p:cNvPr id="4" name="Rectangle 3">
+            <a:extLst>
+              <a:ext uri="{FF2B5EF4-FFF2-40B4-BE49-F238E27FC236}">
+                <a16:creationId xmlns:a16="http://schemas.microsoft.com/office/drawing/2014/main" id="{E32FDB5F-948B-5849-8985-0B426D4CF701}"/>
+              </a:ext>
+            </a:extLst>
+          </p:cNvPr>
+          <p:cNvSpPr/>
+          <p:nvPr/>
+        </p:nvSpPr>
+        <p:spPr>
+          <a:xfrm>
+            <a:off x="4258236" y="546847"/>
+            <a:ext cx="2034988" cy="5764305"/>
+          </a:xfrm>
+          <a:prstGeom prst="rect">
+            <a:avLst/>
+          </a:prstGeom>
+          <a:solidFill>
+            <a:schemeClr val="accent1">
+              <a:lumMod val="20000"/>
+              <a:lumOff val="80000"/>
+            </a:schemeClr>
+          </a:solidFill>
+        </p:spPr>
+        <p:style>
+          <a:lnRef idx="2">
+            <a:schemeClr val="accent1">
+              <a:shade val="50000"/>
+            </a:schemeClr>
+          </a:lnRef>
+          <a:fillRef idx="1">
+            <a:schemeClr val="accent1"/>
+          </a:fillRef>
+          <a:effectRef idx="0">
+            <a:schemeClr val="accent1"/>
+          </a:effectRef>
+          <a:fontRef idx="minor">
+            <a:schemeClr val="lt1"/>
+          </a:fontRef>
+        </p:style>
+        <p:txBody>
+          <a:bodyPr rtlCol="0" anchor="ctr"/>
+          <a:lstStyle/>
+          <a:p>
+            <a:pPr algn="ctr"/>
+            <a:endParaRPr lang="en-GB"/>
+          </a:p>
+        </p:txBody>
+      </p:sp>
+      <p:sp>
+        <p:nvSpPr>
+          <p:cNvPr id="5" name="Left Brace 4">
+            <a:extLst>
+              <a:ext uri="{FF2B5EF4-FFF2-40B4-BE49-F238E27FC236}">
+                <a16:creationId xmlns:a16="http://schemas.microsoft.com/office/drawing/2014/main" id="{D9EBD66D-7054-1343-8C92-47DB36F32D2D}"/>
+              </a:ext>
+            </a:extLst>
+          </p:cNvPr>
+          <p:cNvSpPr/>
+          <p:nvPr/>
+        </p:nvSpPr>
+        <p:spPr>
+          <a:xfrm>
+            <a:off x="3182471" y="546847"/>
+            <a:ext cx="824753" cy="5773271"/>
+          </a:xfrm>
+          <a:prstGeom prst="leftBrace">
+            <a:avLst/>
+          </a:prstGeom>
+          <a:ln w="38100"/>
+        </p:spPr>
+        <p:style>
+          <a:lnRef idx="1">
+            <a:schemeClr val="accent1"/>
+          </a:lnRef>
+          <a:fillRef idx="0">
+            <a:schemeClr val="accent1"/>
+          </a:fillRef>
+          <a:effectRef idx="0">
+            <a:schemeClr val="accent1"/>
+          </a:effectRef>
+          <a:fontRef idx="minor">
+            <a:schemeClr val="tx1"/>
+          </a:fontRef>
+        </p:style>
+        <p:txBody>
+          <a:bodyPr rtlCol="0" anchor="ctr"/>
+          <a:lstStyle/>
+          <a:p>
+            <a:pPr algn="ctr"/>
+            <a:endParaRPr lang="en-GB"/>
+          </a:p>
+        </p:txBody>
+      </p:sp>
+      <p:sp>
+        <p:nvSpPr>
+          <p:cNvPr id="6" name="Rectangle 5">
+            <a:extLst>
+              <a:ext uri="{FF2B5EF4-FFF2-40B4-BE49-F238E27FC236}">
+                <a16:creationId xmlns:a16="http://schemas.microsoft.com/office/drawing/2014/main" id="{E81B709F-511C-2F47-BD59-F3899747C041}"/>
+              </a:ext>
+            </a:extLst>
+          </p:cNvPr>
+          <p:cNvSpPr/>
+          <p:nvPr/>
+        </p:nvSpPr>
+        <p:spPr>
+          <a:xfrm>
+            <a:off x="4258236" y="5450541"/>
+            <a:ext cx="2034988" cy="860611"/>
+          </a:xfrm>
+          <a:prstGeom prst="rect">
+            <a:avLst/>
+          </a:prstGeom>
+        </p:spPr>
+        <p:style>
+          <a:lnRef idx="2">
+            <a:schemeClr val="accent1">
+              <a:shade val="50000"/>
+            </a:schemeClr>
+          </a:lnRef>
+          <a:fillRef idx="1">
+            <a:schemeClr val="accent1"/>
+          </a:fillRef>
+          <a:effectRef idx="0">
+            <a:schemeClr val="accent1"/>
+          </a:effectRef>
+          <a:fontRef idx="minor">
+            <a:schemeClr val="lt1"/>
+          </a:fontRef>
+        </p:style>
+        <p:txBody>
+          <a:bodyPr rtlCol="0" anchor="ctr"/>
+          <a:lstStyle/>
+          <a:p>
+            <a:pPr algn="ctr"/>
+            <a:r>
+              <a:rPr lang="en-GB" dirty="0"/>
+              <a:t>Text</a:t>
+            </a:r>
+          </a:p>
+        </p:txBody>
+      </p:sp>
+      <p:sp>
+        <p:nvSpPr>
+          <p:cNvPr id="7" name="Rectangle 6">
+            <a:extLst>
+              <a:ext uri="{FF2B5EF4-FFF2-40B4-BE49-F238E27FC236}">
+                <a16:creationId xmlns:a16="http://schemas.microsoft.com/office/drawing/2014/main" id="{44CC2FFF-B1D6-C44D-92E4-D2043043B661}"/>
+              </a:ext>
+            </a:extLst>
+          </p:cNvPr>
+          <p:cNvSpPr/>
+          <p:nvPr/>
+        </p:nvSpPr>
+        <p:spPr>
+          <a:xfrm>
+            <a:off x="4258236" y="4589930"/>
+            <a:ext cx="2034988" cy="860611"/>
+          </a:xfrm>
+          <a:prstGeom prst="rect">
+            <a:avLst/>
+          </a:prstGeom>
+        </p:spPr>
+        <p:style>
+          <a:lnRef idx="2">
+            <a:schemeClr val="accent1">
+              <a:shade val="50000"/>
+            </a:schemeClr>
+          </a:lnRef>
+          <a:fillRef idx="1">
+            <a:schemeClr val="accent1"/>
+          </a:fillRef>
+          <a:effectRef idx="0">
+            <a:schemeClr val="accent1"/>
+          </a:effectRef>
+          <a:fontRef idx="minor">
+            <a:schemeClr val="lt1"/>
+          </a:fontRef>
+        </p:style>
+        <p:txBody>
+          <a:bodyPr rtlCol="0" anchor="ctr"/>
+          <a:lstStyle/>
+          <a:p>
+            <a:pPr algn="ctr"/>
+            <a:r>
+              <a:rPr lang="en-GB" dirty="0"/>
+              <a:t>Data</a:t>
+            </a:r>
+          </a:p>
+        </p:txBody>
+      </p:sp>
+      <p:sp>
+        <p:nvSpPr>
+          <p:cNvPr id="8" name="Rectangle 7">
+            <a:extLst>
+              <a:ext uri="{FF2B5EF4-FFF2-40B4-BE49-F238E27FC236}">
+                <a16:creationId xmlns:a16="http://schemas.microsoft.com/office/drawing/2014/main" id="{4D4BE88F-D9EE-4446-9AFC-D5A0ADFCAF2B}"/>
+              </a:ext>
+            </a:extLst>
+          </p:cNvPr>
+          <p:cNvSpPr/>
+          <p:nvPr/>
+        </p:nvSpPr>
+        <p:spPr>
+          <a:xfrm>
+            <a:off x="4258236" y="3272119"/>
+            <a:ext cx="2034988" cy="1317812"/>
+          </a:xfrm>
+          <a:prstGeom prst="rect">
+            <a:avLst/>
+          </a:prstGeom>
+        </p:spPr>
+        <p:style>
+          <a:lnRef idx="2">
+            <a:schemeClr val="accent1">
+              <a:shade val="50000"/>
+            </a:schemeClr>
+          </a:lnRef>
+          <a:fillRef idx="1">
+            <a:schemeClr val="accent1"/>
+          </a:fillRef>
+          <a:effectRef idx="0">
+            <a:schemeClr val="accent1"/>
+          </a:effectRef>
+          <a:fontRef idx="minor">
+            <a:schemeClr val="lt1"/>
+          </a:fontRef>
+        </p:style>
+        <p:txBody>
+          <a:bodyPr rtlCol="0" anchor="ctr"/>
+          <a:lstStyle/>
+          <a:p>
+            <a:pPr algn="ctr"/>
+            <a:r>
+              <a:rPr lang="en-GB" dirty="0"/>
+              <a:t>Heap</a:t>
+            </a:r>
+          </a:p>
+        </p:txBody>
+      </p:sp>
+      <p:sp>
+        <p:nvSpPr>
+          <p:cNvPr id="9" name="Rectangle 8">
+            <a:extLst>
+              <a:ext uri="{FF2B5EF4-FFF2-40B4-BE49-F238E27FC236}">
+                <a16:creationId xmlns:a16="http://schemas.microsoft.com/office/drawing/2014/main" id="{673D868E-F8F4-E54B-9154-F7AABF4DA868}"/>
+              </a:ext>
+            </a:extLst>
+          </p:cNvPr>
+          <p:cNvSpPr/>
+          <p:nvPr/>
+        </p:nvSpPr>
+        <p:spPr>
+          <a:xfrm>
+            <a:off x="4258236" y="546848"/>
+            <a:ext cx="2034988" cy="1066799"/>
+          </a:xfrm>
+          <a:prstGeom prst="rect">
+            <a:avLst/>
+          </a:prstGeom>
+        </p:spPr>
+        <p:style>
+          <a:lnRef idx="2">
+            <a:schemeClr val="accent1">
+              <a:shade val="50000"/>
+            </a:schemeClr>
+          </a:lnRef>
+          <a:fillRef idx="1">
+            <a:schemeClr val="accent1"/>
+          </a:fillRef>
+          <a:effectRef idx="0">
+            <a:schemeClr val="accent1"/>
+          </a:effectRef>
+          <a:fontRef idx="minor">
+            <a:schemeClr val="lt1"/>
+          </a:fontRef>
+        </p:style>
+        <p:txBody>
+          <a:bodyPr rtlCol="0" anchor="ctr"/>
+          <a:lstStyle/>
+          <a:p>
+            <a:pPr algn="ctr"/>
+            <a:r>
+              <a:rPr lang="en-GB" dirty="0"/>
+              <a:t>Stack</a:t>
+            </a:r>
+          </a:p>
+        </p:txBody>
+      </p:sp>
+      <p:sp>
+        <p:nvSpPr>
+          <p:cNvPr id="10" name="TextBox 9">
+            <a:extLst>
+              <a:ext uri="{FF2B5EF4-FFF2-40B4-BE49-F238E27FC236}">
+                <a16:creationId xmlns:a16="http://schemas.microsoft.com/office/drawing/2014/main" id="{6A2C8BB7-C112-6C44-9F96-82FF8FE9E6D3}"/>
+              </a:ext>
+            </a:extLst>
+          </p:cNvPr>
+          <p:cNvSpPr txBox="1"/>
+          <p:nvPr/>
+        </p:nvSpPr>
+        <p:spPr>
+          <a:xfrm>
+            <a:off x="1483661" y="3105833"/>
+            <a:ext cx="1855693" cy="646331"/>
+          </a:xfrm>
+          <a:prstGeom prst="rect">
+            <a:avLst/>
+          </a:prstGeom>
+          <a:noFill/>
+        </p:spPr>
+        <p:txBody>
+          <a:bodyPr wrap="square" rtlCol="0">
+            <a:spAutoFit/>
+          </a:bodyPr>
+          <a:lstStyle/>
+          <a:p>
+            <a:pPr algn="r"/>
+            <a:r>
+              <a:rPr lang="en-GB" dirty="0"/>
+              <a:t>Memory available to a process</a:t>
+            </a:r>
+          </a:p>
+        </p:txBody>
+      </p:sp>
+      <p:cxnSp>
+        <p:nvCxnSpPr>
+          <p:cNvPr id="12" name="Straight Arrow Connector 11">
+            <a:extLst>
+              <a:ext uri="{FF2B5EF4-FFF2-40B4-BE49-F238E27FC236}">
+                <a16:creationId xmlns:a16="http://schemas.microsoft.com/office/drawing/2014/main" id="{F1C02B33-31C0-2146-99DA-F7B47C23E1E3}"/>
+              </a:ext>
+            </a:extLst>
+          </p:cNvPr>
+          <p:cNvCxnSpPr>
+            <a:cxnSpLocks/>
+            <a:stCxn id="8" idx="0"/>
+          </p:cNvCxnSpPr>
+          <p:nvPr/>
+        </p:nvCxnSpPr>
+        <p:spPr>
+          <a:xfrm flipV="1">
+            <a:off x="5275730" y="2734235"/>
+            <a:ext cx="0" cy="537884"/>
+          </a:xfrm>
+          <a:prstGeom prst="straightConnector1">
+            <a:avLst/>
+          </a:prstGeom>
+          <a:ln w="38100">
+            <a:tailEnd type="triangle"/>
+          </a:ln>
+        </p:spPr>
+        <p:style>
+          <a:lnRef idx="1">
+            <a:schemeClr val="accent1"/>
+          </a:lnRef>
+          <a:fillRef idx="0">
+            <a:schemeClr val="accent1"/>
+          </a:fillRef>
+          <a:effectRef idx="0">
+            <a:schemeClr val="accent1"/>
+          </a:effectRef>
+          <a:fontRef idx="minor">
+            <a:schemeClr val="tx1"/>
+          </a:fontRef>
+        </p:style>
+      </p:cxnSp>
+      <p:cxnSp>
+        <p:nvCxnSpPr>
+          <p:cNvPr id="13" name="Straight Arrow Connector 12">
+            <a:extLst>
+              <a:ext uri="{FF2B5EF4-FFF2-40B4-BE49-F238E27FC236}">
+                <a16:creationId xmlns:a16="http://schemas.microsoft.com/office/drawing/2014/main" id="{AFCD793F-873D-B54F-AA31-6AFAFC0A9BB5}"/>
+              </a:ext>
+            </a:extLst>
+          </p:cNvPr>
+          <p:cNvCxnSpPr>
+            <a:cxnSpLocks/>
+            <a:stCxn id="9" idx="2"/>
+          </p:cNvCxnSpPr>
+          <p:nvPr/>
+        </p:nvCxnSpPr>
+        <p:spPr>
+          <a:xfrm>
+            <a:off x="5275730" y="1613647"/>
+            <a:ext cx="0" cy="560295"/>
+          </a:xfrm>
+          <a:prstGeom prst="straightConnector1">
+            <a:avLst/>
+          </a:prstGeom>
+          <a:ln w="38100">
+            <a:tailEnd type="triangle"/>
+          </a:ln>
+        </p:spPr>
+        <p:style>
+          <a:lnRef idx="1">
+            <a:schemeClr val="accent1"/>
+          </a:lnRef>
+          <a:fillRef idx="0">
+            <a:schemeClr val="accent1"/>
+          </a:fillRef>
+          <a:effectRef idx="0">
+            <a:schemeClr val="accent1"/>
+          </a:effectRef>
+          <a:fontRef idx="minor">
+            <a:schemeClr val="tx1"/>
+          </a:fontRef>
+        </p:style>
+      </p:cxnSp>
+      <p:sp>
+        <p:nvSpPr>
+          <p:cNvPr id="17" name="Left Brace 16">
+            <a:extLst>
+              <a:ext uri="{FF2B5EF4-FFF2-40B4-BE49-F238E27FC236}">
+                <a16:creationId xmlns:a16="http://schemas.microsoft.com/office/drawing/2014/main" id="{33E1539E-A78E-FC42-AB77-12D1C56F274B}"/>
+              </a:ext>
+            </a:extLst>
+          </p:cNvPr>
+          <p:cNvSpPr/>
+          <p:nvPr/>
+        </p:nvSpPr>
+        <p:spPr>
+          <a:xfrm rot="10800000">
+            <a:off x="6544236" y="1613647"/>
+            <a:ext cx="824753" cy="1658472"/>
+          </a:xfrm>
+          <a:prstGeom prst="leftBrace">
+            <a:avLst/>
+          </a:prstGeom>
+          <a:ln w="12700"/>
+        </p:spPr>
+        <p:style>
+          <a:lnRef idx="1">
+            <a:schemeClr val="accent1"/>
+          </a:lnRef>
+          <a:fillRef idx="0">
+            <a:schemeClr val="accent1"/>
+          </a:fillRef>
+          <a:effectRef idx="0">
+            <a:schemeClr val="accent1"/>
+          </a:effectRef>
+          <a:fontRef idx="minor">
+            <a:schemeClr val="tx1"/>
+          </a:fontRef>
+        </p:style>
+        <p:txBody>
+          <a:bodyPr rtlCol="0" anchor="ctr"/>
+          <a:lstStyle/>
+          <a:p>
+            <a:pPr algn="ctr"/>
+            <a:endParaRPr lang="en-GB"/>
+          </a:p>
+        </p:txBody>
+      </p:sp>
+      <p:sp>
+        <p:nvSpPr>
+          <p:cNvPr id="18" name="TextBox 17">
+            <a:extLst>
+              <a:ext uri="{FF2B5EF4-FFF2-40B4-BE49-F238E27FC236}">
+                <a16:creationId xmlns:a16="http://schemas.microsoft.com/office/drawing/2014/main" id="{A4EAD242-AD4F-EB46-ACCD-53D57192E76A}"/>
+              </a:ext>
+            </a:extLst>
+          </p:cNvPr>
+          <p:cNvSpPr txBox="1"/>
+          <p:nvPr/>
+        </p:nvSpPr>
+        <p:spPr>
+          <a:xfrm>
+            <a:off x="7212106" y="2087904"/>
+            <a:ext cx="1855693" cy="646331"/>
+          </a:xfrm>
+          <a:prstGeom prst="rect">
+            <a:avLst/>
+          </a:prstGeom>
+          <a:noFill/>
+        </p:spPr>
+        <p:txBody>
+          <a:bodyPr wrap="square" rtlCol="0">
+            <a:spAutoFit/>
+          </a:bodyPr>
+          <a:lstStyle/>
+          <a:p>
+            <a:r>
+              <a:rPr lang="en-GB" dirty="0"/>
+              <a:t>Free memory available</a:t>
+            </a:r>
+          </a:p>
+        </p:txBody>
+      </p:sp>
+    </p:spTree>
+    <p:extLst>
+      <p:ext uri="{BB962C8B-B14F-4D97-AF65-F5344CB8AC3E}">
+        <p14:creationId xmlns:p14="http://schemas.microsoft.com/office/powerpoint/2010/main" val="554229952"/>
+      </p:ext>
+    </p:extLst>
+  </p:cSld>
+  <p:clrMapOvr>
+    <a:masterClrMapping/>
+  </p:clrMapOvr>
+</p:sld>
+</file>
+
+<file path=ppt/slides/slide3.xml><?xml version="1.0" encoding="utf-8"?>
 <p:sld xmlns:a="http://schemas.openxmlformats.org/drawingml/2006/main" xmlns:r="http://schemas.openxmlformats.org/officeDocument/2006/relationships" xmlns:p="http://schemas.openxmlformats.org/presentationml/2006/main">
   <p:cSld>
     <p:spTree>

</xml_diff>

<commit_message>
Add access controll examples
</commit_message>
<xml_diff>
--- a/assets/images/Images.pptx
+++ b/assets/images/Images.pptx
@@ -5,7 +5,7 @@
     <p:sldMasterId id="2147483648" r:id="rId1"/>
   </p:sldMasterIdLst>
   <p:notesMasterIdLst>
-    <p:notesMasterId r:id="rId15"/>
+    <p:notesMasterId r:id="rId16"/>
   </p:notesMasterIdLst>
   <p:sldIdLst>
     <p:sldId id="257" r:id="rId2"/>
@@ -20,7 +20,8 @@
     <p:sldId id="263" r:id="rId11"/>
     <p:sldId id="264" r:id="rId12"/>
     <p:sldId id="265" r:id="rId13"/>
-    <p:sldId id="256" r:id="rId14"/>
+    <p:sldId id="269" r:id="rId14"/>
+    <p:sldId id="256" r:id="rId15"/>
   </p:sldIdLst>
   <p:sldSz cx="12192000" cy="6858000"/>
   <p:notesSz cx="6858000" cy="9144000"/>
@@ -127,7 +128,7 @@
             <p14:sldId id="257"/>
           </p14:sldIdLst>
         </p14:section>
-        <p14:section name="Data Types" id="{D2EF745B-DF6F-1149-A956-99F8C5570964}">
+        <p14:section name="Data Types - Stack and Heap" id="{D2EF745B-DF6F-1149-A956-99F8C5570964}">
           <p14:sldIdLst>
             <p14:sldId id="258"/>
             <p14:sldId id="259"/>
@@ -140,6 +141,11 @@
             <p14:sldId id="263"/>
             <p14:sldId id="264"/>
             <p14:sldId id="265"/>
+          </p14:sldIdLst>
+        </p14:section>
+        <p14:section name="Data Types - Access Modifieres" id="{AE058796-2059-4E48-B40C-7B85D9A86F81}">
+          <p14:sldIdLst>
+            <p14:sldId id="269"/>
           </p14:sldIdLst>
         </p14:section>
         <p14:section name="Testing" id="{064BBB82-ADB6-E844-9D9E-44CD43DCBE9F}">
@@ -241,7 +247,7 @@
           <a:p>
             <a:fld id="{F0373C07-0034-D84F-B0CB-1249B408AEAD}" type="datetimeFigureOut">
               <a:rPr lang="en-GB" smtClean="0"/>
-              <a:t>07/05/2020</a:t>
+              <a:t>08/05/2020</a:t>
             </a:fld>
             <a:endParaRPr lang="en-GB"/>
           </a:p>
@@ -909,7 +915,7 @@
           <a:p>
             <a:fld id="{11A96E62-EC5F-C045-9FEB-EDD3A98888BE}" type="slidenum">
               <a:rPr lang="en-GB" smtClean="0"/>
-              <a:t>13</a:t>
+              <a:t>14</a:t>
             </a:fld>
             <a:endParaRPr lang="en-GB"/>
           </a:p>
@@ -1075,7 +1081,7 @@
           <a:p>
             <a:fld id="{1277814B-86DA-1A43-BEBE-BB22F0FBA56B}" type="datetimeFigureOut">
               <a:rPr lang="en-GB" smtClean="0"/>
-              <a:t>07/05/2020</a:t>
+              <a:t>08/05/2020</a:t>
             </a:fld>
             <a:endParaRPr lang="en-GB"/>
           </a:p>
@@ -1273,7 +1279,7 @@
           <a:p>
             <a:fld id="{1277814B-86DA-1A43-BEBE-BB22F0FBA56B}" type="datetimeFigureOut">
               <a:rPr lang="en-GB" smtClean="0"/>
-              <a:t>07/05/2020</a:t>
+              <a:t>08/05/2020</a:t>
             </a:fld>
             <a:endParaRPr lang="en-GB"/>
           </a:p>
@@ -1481,7 +1487,7 @@
           <a:p>
             <a:fld id="{1277814B-86DA-1A43-BEBE-BB22F0FBA56B}" type="datetimeFigureOut">
               <a:rPr lang="en-GB" smtClean="0"/>
-              <a:t>07/05/2020</a:t>
+              <a:t>08/05/2020</a:t>
             </a:fld>
             <a:endParaRPr lang="en-GB"/>
           </a:p>
@@ -1679,7 +1685,7 @@
           <a:p>
             <a:fld id="{1277814B-86DA-1A43-BEBE-BB22F0FBA56B}" type="datetimeFigureOut">
               <a:rPr lang="en-GB" smtClean="0"/>
-              <a:t>07/05/2020</a:t>
+              <a:t>08/05/2020</a:t>
             </a:fld>
             <a:endParaRPr lang="en-GB"/>
           </a:p>
@@ -1954,7 +1960,7 @@
           <a:p>
             <a:fld id="{1277814B-86DA-1A43-BEBE-BB22F0FBA56B}" type="datetimeFigureOut">
               <a:rPr lang="en-GB" smtClean="0"/>
-              <a:t>07/05/2020</a:t>
+              <a:t>08/05/2020</a:t>
             </a:fld>
             <a:endParaRPr lang="en-GB"/>
           </a:p>
@@ -2219,7 +2225,7 @@
           <a:p>
             <a:fld id="{1277814B-86DA-1A43-BEBE-BB22F0FBA56B}" type="datetimeFigureOut">
               <a:rPr lang="en-GB" smtClean="0"/>
-              <a:t>07/05/2020</a:t>
+              <a:t>08/05/2020</a:t>
             </a:fld>
             <a:endParaRPr lang="en-GB"/>
           </a:p>
@@ -2631,7 +2637,7 @@
           <a:p>
             <a:fld id="{1277814B-86DA-1A43-BEBE-BB22F0FBA56B}" type="datetimeFigureOut">
               <a:rPr lang="en-GB" smtClean="0"/>
-              <a:t>07/05/2020</a:t>
+              <a:t>08/05/2020</a:t>
             </a:fld>
             <a:endParaRPr lang="en-GB"/>
           </a:p>
@@ -2772,7 +2778,7 @@
           <a:p>
             <a:fld id="{1277814B-86DA-1A43-BEBE-BB22F0FBA56B}" type="datetimeFigureOut">
               <a:rPr lang="en-GB" smtClean="0"/>
-              <a:t>07/05/2020</a:t>
+              <a:t>08/05/2020</a:t>
             </a:fld>
             <a:endParaRPr lang="en-GB"/>
           </a:p>
@@ -2885,7 +2891,7 @@
           <a:p>
             <a:fld id="{1277814B-86DA-1A43-BEBE-BB22F0FBA56B}" type="datetimeFigureOut">
               <a:rPr lang="en-GB" smtClean="0"/>
-              <a:t>07/05/2020</a:t>
+              <a:t>08/05/2020</a:t>
             </a:fld>
             <a:endParaRPr lang="en-GB"/>
           </a:p>
@@ -3196,7 +3202,7 @@
           <a:p>
             <a:fld id="{1277814B-86DA-1A43-BEBE-BB22F0FBA56B}" type="datetimeFigureOut">
               <a:rPr lang="en-GB" smtClean="0"/>
-              <a:t>07/05/2020</a:t>
+              <a:t>08/05/2020</a:t>
             </a:fld>
             <a:endParaRPr lang="en-GB"/>
           </a:p>
@@ -3484,7 +3490,7 @@
           <a:p>
             <a:fld id="{1277814B-86DA-1A43-BEBE-BB22F0FBA56B}" type="datetimeFigureOut">
               <a:rPr lang="en-GB" smtClean="0"/>
-              <a:t>07/05/2020</a:t>
+              <a:t>08/05/2020</a:t>
             </a:fld>
             <a:endParaRPr lang="en-GB"/>
           </a:p>
@@ -3725,7 +3731,7 @@
           <a:p>
             <a:fld id="{1277814B-86DA-1A43-BEBE-BB22F0FBA56B}" type="datetimeFigureOut">
               <a:rPr lang="en-GB" smtClean="0"/>
-              <a:t>07/05/2020</a:t>
+              <a:t>08/05/2020</a:t>
             </a:fld>
             <a:endParaRPr lang="en-GB"/>
           </a:p>
@@ -6592,6 +6598,157 @@
 </file>
 
 <file path=ppt/slides/slide13.xml><?xml version="1.0" encoding="utf-8"?>
+<p:sld xmlns:a="http://schemas.openxmlformats.org/drawingml/2006/main" xmlns:r="http://schemas.openxmlformats.org/officeDocument/2006/relationships" xmlns:p="http://schemas.openxmlformats.org/presentationml/2006/main">
+  <p:cSld>
+    <p:spTree>
+      <p:nvGrpSpPr>
+        <p:cNvPr id="1" name=""/>
+        <p:cNvGrpSpPr/>
+        <p:nvPr/>
+      </p:nvGrpSpPr>
+      <p:grpSpPr>
+        <a:xfrm>
+          <a:off x="0" y="0"/>
+          <a:ext cx="0" cy="0"/>
+          <a:chOff x="0" y="0"/>
+          <a:chExt cx="0" cy="0"/>
+        </a:xfrm>
+      </p:grpSpPr>
+      <p:pic>
+        <p:nvPicPr>
+          <p:cNvPr id="4" name="Picture 3">
+            <a:extLst>
+              <a:ext uri="{FF2B5EF4-FFF2-40B4-BE49-F238E27FC236}">
+                <a16:creationId xmlns:a16="http://schemas.microsoft.com/office/drawing/2014/main" id="{AFE8EFDB-CCDF-E64B-8B9B-A45307BDFBB1}"/>
+              </a:ext>
+            </a:extLst>
+          </p:cNvPr>
+          <p:cNvPicPr>
+            <a:picLocks noChangeAspect="1"/>
+          </p:cNvPicPr>
+          <p:nvPr/>
+        </p:nvPicPr>
+        <p:blipFill>
+          <a:blip r:embed="rId2"/>
+          <a:stretch>
+            <a:fillRect/>
+          </a:stretch>
+        </p:blipFill>
+        <p:spPr>
+          <a:xfrm>
+            <a:off x="1545872" y="810622"/>
+            <a:ext cx="4838700" cy="4635500"/>
+          </a:xfrm>
+          <a:prstGeom prst="rect">
+            <a:avLst/>
+          </a:prstGeom>
+        </p:spPr>
+      </p:pic>
+      <p:sp>
+        <p:nvSpPr>
+          <p:cNvPr id="10" name="Arc 9">
+            <a:extLst>
+              <a:ext uri="{FF2B5EF4-FFF2-40B4-BE49-F238E27FC236}">
+                <a16:creationId xmlns:a16="http://schemas.microsoft.com/office/drawing/2014/main" id="{EAFF5220-A791-E94F-831C-D6C79A2E7238}"/>
+              </a:ext>
+            </a:extLst>
+          </p:cNvPr>
+          <p:cNvSpPr/>
+          <p:nvPr/>
+        </p:nvSpPr>
+        <p:spPr>
+          <a:xfrm>
+            <a:off x="1335494" y="2399741"/>
+            <a:ext cx="5979706" cy="2245125"/>
+          </a:xfrm>
+          <a:prstGeom prst="arc">
+            <a:avLst>
+              <a:gd name="adj1" fmla="val 16200000"/>
+              <a:gd name="adj2" fmla="val 5957216"/>
+            </a:avLst>
+          </a:prstGeom>
+          <a:ln w="38100">
+            <a:solidFill>
+              <a:srgbClr val="FF0000"/>
+            </a:solidFill>
+            <a:headEnd type="arrow" w="med" len="med"/>
+            <a:tailEnd type="none" w="med" len="med"/>
+          </a:ln>
+        </p:spPr>
+        <p:style>
+          <a:lnRef idx="1">
+            <a:schemeClr val="accent1"/>
+          </a:lnRef>
+          <a:fillRef idx="0">
+            <a:schemeClr val="accent1"/>
+          </a:fillRef>
+          <a:effectRef idx="0">
+            <a:schemeClr val="accent1"/>
+          </a:effectRef>
+          <a:fontRef idx="minor">
+            <a:schemeClr val="tx1"/>
+          </a:fontRef>
+        </p:style>
+        <p:txBody>
+          <a:bodyPr rtlCol="0" anchor="ctr"/>
+          <a:lstStyle/>
+          <a:p>
+            <a:pPr algn="ctr"/>
+            <a:endParaRPr lang="en-GB"/>
+          </a:p>
+        </p:txBody>
+      </p:sp>
+      <p:sp>
+        <p:nvSpPr>
+          <p:cNvPr id="5" name="TextBox 4">
+            <a:extLst>
+              <a:ext uri="{FF2B5EF4-FFF2-40B4-BE49-F238E27FC236}">
+                <a16:creationId xmlns:a16="http://schemas.microsoft.com/office/drawing/2014/main" id="{3AB9BB34-C79D-C840-8F80-88028878916A}"/>
+              </a:ext>
+            </a:extLst>
+          </p:cNvPr>
+          <p:cNvSpPr txBox="1"/>
+          <p:nvPr/>
+        </p:nvSpPr>
+        <p:spPr>
+          <a:xfrm>
+            <a:off x="6980582" y="3105834"/>
+            <a:ext cx="2404533" cy="646331"/>
+          </a:xfrm>
+          <a:prstGeom prst="rect">
+            <a:avLst/>
+          </a:prstGeom>
+          <a:solidFill>
+            <a:schemeClr val="bg1"/>
+          </a:solidFill>
+        </p:spPr>
+        <p:txBody>
+          <a:bodyPr wrap="square" rtlCol="0">
+            <a:spAutoFit/>
+          </a:bodyPr>
+          <a:lstStyle/>
+          <a:p>
+            <a:r>
+              <a:rPr lang="en-GB" dirty="0"/>
+              <a:t>One Java source file produces two class files</a:t>
+            </a:r>
+          </a:p>
+        </p:txBody>
+      </p:sp>
+    </p:spTree>
+    <p:extLst>
+      <p:ext uri="{BB962C8B-B14F-4D97-AF65-F5344CB8AC3E}">
+        <p14:creationId xmlns:p14="http://schemas.microsoft.com/office/powerpoint/2010/main" val="4212801109"/>
+      </p:ext>
+    </p:extLst>
+  </p:cSld>
+  <p:clrMapOvr>
+    <a:masterClrMapping/>
+  </p:clrMapOvr>
+</p:sld>
+</file>
+
+<file path=ppt/slides/slide14.xml><?xml version="1.0" encoding="utf-8"?>
 <p:sld xmlns:a="http://schemas.openxmlformats.org/drawingml/2006/main" xmlns:r="http://schemas.openxmlformats.org/officeDocument/2006/relationships" xmlns:p="http://schemas.openxmlformats.org/presentationml/2006/main">
   <p:cSld>
     <p:spTree>

</xml_diff>

<commit_message>
Add several changes (WIP)
</commit_message>
<xml_diff>
--- a/assets/images/Images.pptx
+++ b/assets/images/Images.pptx
@@ -5,7 +5,7 @@
     <p:sldMasterId id="2147483648" r:id="rId1"/>
   </p:sldMasterIdLst>
   <p:notesMasterIdLst>
-    <p:notesMasterId r:id="rId16"/>
+    <p:notesMasterId r:id="rId18"/>
   </p:notesMasterIdLst>
   <p:sldIdLst>
     <p:sldId id="257" r:id="rId2"/>
@@ -21,7 +21,9 @@
     <p:sldId id="264" r:id="rId12"/>
     <p:sldId id="265" r:id="rId13"/>
     <p:sldId id="269" r:id="rId14"/>
-    <p:sldId id="256" r:id="rId15"/>
+    <p:sldId id="271" r:id="rId15"/>
+    <p:sldId id="270" r:id="rId16"/>
+    <p:sldId id="256" r:id="rId17"/>
   </p:sldIdLst>
   <p:sldSz cx="12192000" cy="6858000"/>
   <p:notesSz cx="6858000" cy="9144000"/>
@@ -148,6 +150,12 @@
             <p14:sldId id="269"/>
           </p14:sldIdLst>
         </p14:section>
+        <p14:section name="Collections - Arrays &amp; Java Heap" id="{A77C8035-645E-BC41-A860-8F1EAD9648FF}">
+          <p14:sldIdLst>
+            <p14:sldId id="271"/>
+            <p14:sldId id="270"/>
+          </p14:sldIdLst>
+        </p14:section>
         <p14:section name="Testing" id="{064BBB82-ADB6-E844-9D9E-44CD43DCBE9F}">
           <p14:sldIdLst>
             <p14:sldId id="256"/>
@@ -915,7 +923,7 @@
           <a:p>
             <a:fld id="{11A96E62-EC5F-C045-9FEB-EDD3A98888BE}" type="slidenum">
               <a:rPr lang="en-GB" smtClean="0"/>
-              <a:t>14</a:t>
+              <a:t>16</a:t>
             </a:fld>
             <a:endParaRPr lang="en-GB"/>
           </a:p>
@@ -6749,6 +6757,66 @@
 </file>
 
 <file path=ppt/slides/slide14.xml><?xml version="1.0" encoding="utf-8"?>
+<p:sld xmlns:a="http://schemas.openxmlformats.org/drawingml/2006/main" xmlns:r="http://schemas.openxmlformats.org/officeDocument/2006/relationships" xmlns:p="http://schemas.openxmlformats.org/presentationml/2006/main">
+  <p:cSld>
+    <p:spTree>
+      <p:nvGrpSpPr>
+        <p:cNvPr id="1" name=""/>
+        <p:cNvGrpSpPr/>
+        <p:nvPr/>
+      </p:nvGrpSpPr>
+      <p:grpSpPr>
+        <a:xfrm>
+          <a:off x="0" y="0"/>
+          <a:ext cx="0" cy="0"/>
+          <a:chOff x="0" y="0"/>
+          <a:chExt cx="0" cy="0"/>
+        </a:xfrm>
+      </p:grpSpPr>
+    </p:spTree>
+    <p:extLst>
+      <p:ext uri="{BB962C8B-B14F-4D97-AF65-F5344CB8AC3E}">
+        <p14:creationId xmlns:p14="http://schemas.microsoft.com/office/powerpoint/2010/main" val="326342617"/>
+      </p:ext>
+    </p:extLst>
+  </p:cSld>
+  <p:clrMapOvr>
+    <a:masterClrMapping/>
+  </p:clrMapOvr>
+</p:sld>
+</file>
+
+<file path=ppt/slides/slide15.xml><?xml version="1.0" encoding="utf-8"?>
+<p:sld xmlns:a="http://schemas.openxmlformats.org/drawingml/2006/main" xmlns:r="http://schemas.openxmlformats.org/officeDocument/2006/relationships" xmlns:p="http://schemas.openxmlformats.org/presentationml/2006/main">
+  <p:cSld>
+    <p:spTree>
+      <p:nvGrpSpPr>
+        <p:cNvPr id="1" name=""/>
+        <p:cNvGrpSpPr/>
+        <p:nvPr/>
+      </p:nvGrpSpPr>
+      <p:grpSpPr>
+        <a:xfrm>
+          <a:off x="0" y="0"/>
+          <a:ext cx="0" cy="0"/>
+          <a:chOff x="0" y="0"/>
+          <a:chExt cx="0" cy="0"/>
+        </a:xfrm>
+      </p:grpSpPr>
+    </p:spTree>
+    <p:extLst>
+      <p:ext uri="{BB962C8B-B14F-4D97-AF65-F5344CB8AC3E}">
+        <p14:creationId xmlns:p14="http://schemas.microsoft.com/office/powerpoint/2010/main" val="606586767"/>
+      </p:ext>
+    </p:extLst>
+  </p:cSld>
+  <p:clrMapOvr>
+    <a:masterClrMapping/>
+  </p:clrMapOvr>
+</p:sld>
+</file>
+
+<file path=ppt/slides/slide16.xml><?xml version="1.0" encoding="utf-8"?>
 <p:sld xmlns:a="http://schemas.openxmlformats.org/drawingml/2006/main" xmlns:r="http://schemas.openxmlformats.org/officeDocument/2006/relationships" xmlns:p="http://schemas.openxmlformats.org/presentationml/2006/main">
   <p:cSld>
     <p:spTree>

</xml_diff>